<commit_message>
add pingpong delay sample
</commit_message>
<xml_diff>
--- a/mydelaynode.pptx
+++ b/mydelaynode.pptx
@@ -6,6 +6,7 @@
   </p:sldMasterIdLst>
   <p:sldIdLst>
     <p:sldId id="256" r:id="rId2"/>
+    <p:sldId id="257" r:id="rId3"/>
   </p:sldIdLst>
   <p:sldSz cx="12192000" cy="6858000"/>
   <p:notesSz cx="6858000" cy="9144000"/>
@@ -104,6 +105,11 @@
       </a:defRPr>
     </a:lvl9pPr>
   </p:defaultTextStyle>
+  <p:extLst>
+    <p:ext uri="{EFAFB233-063F-42B5-8137-9DF3F51BA10A}">
+      <p15:sldGuideLst xmlns:p15="http://schemas.microsoft.com/office/powerpoint/2012/main"/>
+    </p:ext>
+  </p:extLst>
 </p:presentation>
 </file>
 
@@ -238,7 +244,7 @@
           <a:p>
             <a:fld id="{5FF7C1F3-9E96-4A7D-8EC8-54A447EFE7EC}" type="datetimeFigureOut">
               <a:rPr kumimoji="1" lang="ja-JP" altLang="en-US" smtClean="0"/>
-              <a:t>2019/1/26</a:t>
+              <a:t>2019/1/31</a:t>
             </a:fld>
             <a:endParaRPr kumimoji="1" lang="ja-JP" altLang="en-US"/>
           </a:p>
@@ -440,7 +446,7 @@
           <a:p>
             <a:fld id="{5FF7C1F3-9E96-4A7D-8EC8-54A447EFE7EC}" type="datetimeFigureOut">
               <a:rPr kumimoji="1" lang="ja-JP" altLang="en-US" smtClean="0"/>
-              <a:t>2019/1/26</a:t>
+              <a:t>2019/1/31</a:t>
             </a:fld>
             <a:endParaRPr kumimoji="1" lang="ja-JP" altLang="en-US"/>
           </a:p>
@@ -652,7 +658,7 @@
           <a:p>
             <a:fld id="{5FF7C1F3-9E96-4A7D-8EC8-54A447EFE7EC}" type="datetimeFigureOut">
               <a:rPr kumimoji="1" lang="ja-JP" altLang="en-US" smtClean="0"/>
-              <a:t>2019/1/26</a:t>
+              <a:t>2019/1/31</a:t>
             </a:fld>
             <a:endParaRPr kumimoji="1" lang="ja-JP" altLang="en-US"/>
           </a:p>
@@ -854,7 +860,7 @@
           <a:p>
             <a:fld id="{5FF7C1F3-9E96-4A7D-8EC8-54A447EFE7EC}" type="datetimeFigureOut">
               <a:rPr kumimoji="1" lang="ja-JP" altLang="en-US" smtClean="0"/>
-              <a:t>2019/1/26</a:t>
+              <a:t>2019/1/31</a:t>
             </a:fld>
             <a:endParaRPr kumimoji="1" lang="ja-JP" altLang="en-US"/>
           </a:p>
@@ -1100,7 +1106,7 @@
           <a:p>
             <a:fld id="{5FF7C1F3-9E96-4A7D-8EC8-54A447EFE7EC}" type="datetimeFigureOut">
               <a:rPr kumimoji="1" lang="ja-JP" altLang="en-US" smtClean="0"/>
-              <a:t>2019/1/26</a:t>
+              <a:t>2019/1/31</a:t>
             </a:fld>
             <a:endParaRPr kumimoji="1" lang="ja-JP" altLang="en-US"/>
           </a:p>
@@ -1396,7 +1402,7 @@
           <a:p>
             <a:fld id="{5FF7C1F3-9E96-4A7D-8EC8-54A447EFE7EC}" type="datetimeFigureOut">
               <a:rPr kumimoji="1" lang="ja-JP" altLang="en-US" smtClean="0"/>
-              <a:t>2019/1/26</a:t>
+              <a:t>2019/1/31</a:t>
             </a:fld>
             <a:endParaRPr kumimoji="1" lang="ja-JP" altLang="en-US"/>
           </a:p>
@@ -1827,7 +1833,7 @@
           <a:p>
             <a:fld id="{5FF7C1F3-9E96-4A7D-8EC8-54A447EFE7EC}" type="datetimeFigureOut">
               <a:rPr kumimoji="1" lang="ja-JP" altLang="en-US" smtClean="0"/>
-              <a:t>2019/1/26</a:t>
+              <a:t>2019/1/31</a:t>
             </a:fld>
             <a:endParaRPr kumimoji="1" lang="ja-JP" altLang="en-US"/>
           </a:p>
@@ -1945,7 +1951,7 @@
           <a:p>
             <a:fld id="{5FF7C1F3-9E96-4A7D-8EC8-54A447EFE7EC}" type="datetimeFigureOut">
               <a:rPr kumimoji="1" lang="ja-JP" altLang="en-US" smtClean="0"/>
-              <a:t>2019/1/26</a:t>
+              <a:t>2019/1/31</a:t>
             </a:fld>
             <a:endParaRPr kumimoji="1" lang="ja-JP" altLang="en-US"/>
           </a:p>
@@ -2040,7 +2046,7 @@
           <a:p>
             <a:fld id="{5FF7C1F3-9E96-4A7D-8EC8-54A447EFE7EC}" type="datetimeFigureOut">
               <a:rPr kumimoji="1" lang="ja-JP" altLang="en-US" smtClean="0"/>
-              <a:t>2019/1/26</a:t>
+              <a:t>2019/1/31</a:t>
             </a:fld>
             <a:endParaRPr kumimoji="1" lang="ja-JP" altLang="en-US"/>
           </a:p>
@@ -2349,7 +2355,7 @@
           <a:p>
             <a:fld id="{5FF7C1F3-9E96-4A7D-8EC8-54A447EFE7EC}" type="datetimeFigureOut">
               <a:rPr kumimoji="1" lang="ja-JP" altLang="en-US" smtClean="0"/>
-              <a:t>2019/1/26</a:t>
+              <a:t>2019/1/31</a:t>
             </a:fld>
             <a:endParaRPr kumimoji="1" lang="ja-JP" altLang="en-US"/>
           </a:p>
@@ -2602,7 +2608,7 @@
           <a:p>
             <a:fld id="{5FF7C1F3-9E96-4A7D-8EC8-54A447EFE7EC}" type="datetimeFigureOut">
               <a:rPr kumimoji="1" lang="ja-JP" altLang="en-US" smtClean="0"/>
-              <a:t>2019/1/26</a:t>
+              <a:t>2019/1/31</a:t>
             </a:fld>
             <a:endParaRPr kumimoji="1" lang="ja-JP" altLang="en-US"/>
           </a:p>
@@ -2847,7 +2853,7 @@
           <a:p>
             <a:fld id="{5FF7C1F3-9E96-4A7D-8EC8-54A447EFE7EC}" type="datetimeFigureOut">
               <a:rPr kumimoji="1" lang="ja-JP" altLang="en-US" smtClean="0"/>
-              <a:t>2019/1/26</a:t>
+              <a:t>2019/1/31</a:t>
             </a:fld>
             <a:endParaRPr kumimoji="1" lang="ja-JP" altLang="en-US"/>
           </a:p>
@@ -4541,6 +4547,2329 @@
 </p:sld>
 </file>
 
+<file path=ppt/slides/slide2.xml><?xml version="1.0" encoding="utf-8"?>
+<p:sld xmlns:a="http://schemas.openxmlformats.org/drawingml/2006/main" xmlns:r="http://schemas.openxmlformats.org/officeDocument/2006/relationships" xmlns:p="http://schemas.openxmlformats.org/presentationml/2006/main">
+  <p:cSld>
+    <p:spTree>
+      <p:nvGrpSpPr>
+        <p:cNvPr id="1" name=""/>
+        <p:cNvGrpSpPr/>
+        <p:nvPr/>
+      </p:nvGrpSpPr>
+      <p:grpSpPr>
+        <a:xfrm>
+          <a:off x="0" y="0"/>
+          <a:ext cx="0" cy="0"/>
+          <a:chOff x="0" y="0"/>
+          <a:chExt cx="0" cy="0"/>
+        </a:xfrm>
+      </p:grpSpPr>
+      <p:sp>
+        <p:nvSpPr>
+          <p:cNvPr id="4" name="正方形/長方形 3"/>
+          <p:cNvSpPr/>
+          <p:nvPr/>
+        </p:nvSpPr>
+        <p:spPr>
+          <a:xfrm>
+            <a:off x="839416" y="1412776"/>
+            <a:ext cx="1152128" cy="432048"/>
+          </a:xfrm>
+          <a:prstGeom prst="rect">
+            <a:avLst/>
+          </a:prstGeom>
+          <a:solidFill>
+            <a:schemeClr val="accent1"/>
+          </a:solidFill>
+          <a:ln>
+            <a:solidFill>
+              <a:schemeClr val="accent1">
+                <a:lumMod val="50000"/>
+              </a:schemeClr>
+            </a:solidFill>
+          </a:ln>
+        </p:spPr>
+        <p:style>
+          <a:lnRef idx="2">
+            <a:schemeClr val="accent1">
+              <a:shade val="50000"/>
+            </a:schemeClr>
+          </a:lnRef>
+          <a:fillRef idx="1">
+            <a:schemeClr val="accent1"/>
+          </a:fillRef>
+          <a:effectRef idx="0">
+            <a:schemeClr val="accent1"/>
+          </a:effectRef>
+          <a:fontRef idx="minor">
+            <a:schemeClr val="lt1"/>
+          </a:fontRef>
+        </p:style>
+        <p:txBody>
+          <a:bodyPr rtlCol="0" anchor="ctr"/>
+          <a:lstStyle/>
+          <a:p>
+            <a:pPr algn="ctr"/>
+            <a:r>
+              <a:rPr kumimoji="1" lang="en-US" altLang="ja-JP" dirty="0" err="1" smtClean="0"/>
+              <a:t>GainNode</a:t>
+            </a:r>
+            <a:endParaRPr kumimoji="1" lang="ja-JP" altLang="en-US" dirty="0"/>
+          </a:p>
+        </p:txBody>
+      </p:sp>
+      <p:sp>
+        <p:nvSpPr>
+          <p:cNvPr id="6" name="正方形/長方形 5"/>
+          <p:cNvSpPr/>
+          <p:nvPr/>
+        </p:nvSpPr>
+        <p:spPr>
+          <a:xfrm>
+            <a:off x="2495600" y="1412776"/>
+            <a:ext cx="1368149" cy="432048"/>
+          </a:xfrm>
+          <a:prstGeom prst="rect">
+            <a:avLst/>
+          </a:prstGeom>
+          <a:ln>
+            <a:solidFill>
+              <a:schemeClr val="accent1">
+                <a:lumMod val="50000"/>
+              </a:schemeClr>
+            </a:solidFill>
+          </a:ln>
+        </p:spPr>
+        <p:style>
+          <a:lnRef idx="2">
+            <a:schemeClr val="accent1">
+              <a:shade val="50000"/>
+            </a:schemeClr>
+          </a:lnRef>
+          <a:fillRef idx="1">
+            <a:schemeClr val="accent1"/>
+          </a:fillRef>
+          <a:effectRef idx="0">
+            <a:schemeClr val="accent1"/>
+          </a:effectRef>
+          <a:fontRef idx="minor">
+            <a:schemeClr val="lt1"/>
+          </a:fontRef>
+        </p:style>
+        <p:txBody>
+          <a:bodyPr rtlCol="0" anchor="ctr"/>
+          <a:lstStyle/>
+          <a:p>
+            <a:pPr algn="ctr"/>
+            <a:r>
+              <a:rPr kumimoji="1" lang="en-US" altLang="ja-JP" dirty="0" err="1" smtClean="0"/>
+              <a:t>DelayNode</a:t>
+            </a:r>
+            <a:endParaRPr kumimoji="1" lang="ja-JP" altLang="en-US" dirty="0"/>
+          </a:p>
+        </p:txBody>
+      </p:sp>
+      <p:sp>
+        <p:nvSpPr>
+          <p:cNvPr id="8" name="正方形/長方形 7"/>
+          <p:cNvSpPr/>
+          <p:nvPr/>
+        </p:nvSpPr>
+        <p:spPr>
+          <a:xfrm>
+            <a:off x="839415" y="1844824"/>
+            <a:ext cx="1152128" cy="432048"/>
+          </a:xfrm>
+          <a:prstGeom prst="rect">
+            <a:avLst/>
+          </a:prstGeom>
+          <a:solidFill>
+            <a:schemeClr val="bg1"/>
+          </a:solidFill>
+          <a:ln>
+            <a:solidFill>
+              <a:schemeClr val="accent1">
+                <a:lumMod val="50000"/>
+              </a:schemeClr>
+            </a:solidFill>
+          </a:ln>
+        </p:spPr>
+        <p:style>
+          <a:lnRef idx="2">
+            <a:schemeClr val="accent1">
+              <a:shade val="50000"/>
+            </a:schemeClr>
+          </a:lnRef>
+          <a:fillRef idx="1">
+            <a:schemeClr val="accent1"/>
+          </a:fillRef>
+          <a:effectRef idx="0">
+            <a:schemeClr val="accent1"/>
+          </a:effectRef>
+          <a:fontRef idx="minor">
+            <a:schemeClr val="lt1"/>
+          </a:fontRef>
+        </p:style>
+        <p:txBody>
+          <a:bodyPr rtlCol="0" anchor="ctr"/>
+          <a:lstStyle/>
+          <a:p>
+            <a:r>
+              <a:rPr kumimoji="1" lang="en-US" altLang="ja-JP" dirty="0" smtClean="0">
+                <a:solidFill>
+                  <a:schemeClr val="accent1"/>
+                </a:solidFill>
+              </a:rPr>
+              <a:t>gain</a:t>
+            </a:r>
+            <a:endParaRPr kumimoji="1" lang="ja-JP" altLang="en-US" dirty="0">
+              <a:solidFill>
+                <a:schemeClr val="accent1"/>
+              </a:solidFill>
+            </a:endParaRPr>
+          </a:p>
+        </p:txBody>
+      </p:sp>
+      <p:sp>
+        <p:nvSpPr>
+          <p:cNvPr id="9" name="正方形/長方形 8"/>
+          <p:cNvSpPr/>
+          <p:nvPr/>
+        </p:nvSpPr>
+        <p:spPr>
+          <a:xfrm>
+            <a:off x="2495600" y="1844824"/>
+            <a:ext cx="1368149" cy="432048"/>
+          </a:xfrm>
+          <a:prstGeom prst="rect">
+            <a:avLst/>
+          </a:prstGeom>
+          <a:solidFill>
+            <a:schemeClr val="bg1"/>
+          </a:solidFill>
+          <a:ln>
+            <a:solidFill>
+              <a:schemeClr val="accent1">
+                <a:lumMod val="50000"/>
+              </a:schemeClr>
+            </a:solidFill>
+          </a:ln>
+        </p:spPr>
+        <p:style>
+          <a:lnRef idx="2">
+            <a:schemeClr val="accent1">
+              <a:shade val="50000"/>
+            </a:schemeClr>
+          </a:lnRef>
+          <a:fillRef idx="1">
+            <a:schemeClr val="accent1"/>
+          </a:fillRef>
+          <a:effectRef idx="0">
+            <a:schemeClr val="accent1"/>
+          </a:effectRef>
+          <a:fontRef idx="minor">
+            <a:schemeClr val="lt1"/>
+          </a:fontRef>
+        </p:style>
+        <p:txBody>
+          <a:bodyPr rtlCol="0" anchor="ctr"/>
+          <a:lstStyle/>
+          <a:p>
+            <a:r>
+              <a:rPr lang="en-US" altLang="ja-JP" dirty="0" err="1" smtClean="0">
+                <a:solidFill>
+                  <a:schemeClr val="accent1"/>
+                </a:solidFill>
+              </a:rPr>
+              <a:t>delayTime</a:t>
+            </a:r>
+            <a:endParaRPr kumimoji="1" lang="ja-JP" altLang="en-US" dirty="0">
+              <a:solidFill>
+                <a:schemeClr val="accent1"/>
+              </a:solidFill>
+            </a:endParaRPr>
+          </a:p>
+        </p:txBody>
+      </p:sp>
+      <p:sp>
+        <p:nvSpPr>
+          <p:cNvPr id="10" name="正方形/長方形 9"/>
+          <p:cNvSpPr/>
+          <p:nvPr/>
+        </p:nvSpPr>
+        <p:spPr>
+          <a:xfrm>
+            <a:off x="6240016" y="2204864"/>
+            <a:ext cx="1656183" cy="432048"/>
+          </a:xfrm>
+          <a:prstGeom prst="rect">
+            <a:avLst/>
+          </a:prstGeom>
+          <a:solidFill>
+            <a:schemeClr val="accent1"/>
+          </a:solidFill>
+          <a:ln>
+            <a:solidFill>
+              <a:schemeClr val="accent1">
+                <a:lumMod val="50000"/>
+              </a:schemeClr>
+            </a:solidFill>
+          </a:ln>
+        </p:spPr>
+        <p:style>
+          <a:lnRef idx="2">
+            <a:schemeClr val="accent1">
+              <a:shade val="50000"/>
+            </a:schemeClr>
+          </a:lnRef>
+          <a:fillRef idx="1">
+            <a:schemeClr val="accent1"/>
+          </a:fillRef>
+          <a:effectRef idx="0">
+            <a:schemeClr val="accent1"/>
+          </a:effectRef>
+          <a:fontRef idx="minor">
+            <a:schemeClr val="lt1"/>
+          </a:fontRef>
+        </p:style>
+        <p:txBody>
+          <a:bodyPr rtlCol="0" anchor="ctr"/>
+          <a:lstStyle/>
+          <a:p>
+            <a:pPr algn="ctr"/>
+            <a:r>
+              <a:rPr kumimoji="1" lang="en-US" altLang="ja-JP" dirty="0" err="1" smtClean="0"/>
+              <a:t>GainNode</a:t>
+            </a:r>
+            <a:endParaRPr kumimoji="1" lang="ja-JP" altLang="en-US" dirty="0"/>
+          </a:p>
+        </p:txBody>
+      </p:sp>
+      <p:sp>
+        <p:nvSpPr>
+          <p:cNvPr id="11" name="正方形/長方形 10"/>
+          <p:cNvSpPr/>
+          <p:nvPr/>
+        </p:nvSpPr>
+        <p:spPr>
+          <a:xfrm>
+            <a:off x="6240016" y="2636912"/>
+            <a:ext cx="1656184" cy="432048"/>
+          </a:xfrm>
+          <a:prstGeom prst="rect">
+            <a:avLst/>
+          </a:prstGeom>
+          <a:solidFill>
+            <a:schemeClr val="bg1"/>
+          </a:solidFill>
+          <a:ln>
+            <a:solidFill>
+              <a:schemeClr val="accent1">
+                <a:lumMod val="50000"/>
+              </a:schemeClr>
+            </a:solidFill>
+          </a:ln>
+        </p:spPr>
+        <p:style>
+          <a:lnRef idx="2">
+            <a:schemeClr val="accent1">
+              <a:shade val="50000"/>
+            </a:schemeClr>
+          </a:lnRef>
+          <a:fillRef idx="1">
+            <a:schemeClr val="accent1"/>
+          </a:fillRef>
+          <a:effectRef idx="0">
+            <a:schemeClr val="accent1"/>
+          </a:effectRef>
+          <a:fontRef idx="minor">
+            <a:schemeClr val="lt1"/>
+          </a:fontRef>
+        </p:style>
+        <p:txBody>
+          <a:bodyPr rtlCol="0" anchor="ctr"/>
+          <a:lstStyle/>
+          <a:p>
+            <a:r>
+              <a:rPr kumimoji="1" lang="en-US" altLang="ja-JP" dirty="0" smtClean="0">
+                <a:solidFill>
+                  <a:schemeClr val="accent1"/>
+                </a:solidFill>
+              </a:rPr>
+              <a:t>gain (feedback)</a:t>
+            </a:r>
+            <a:endParaRPr kumimoji="1" lang="ja-JP" altLang="en-US" dirty="0">
+              <a:solidFill>
+                <a:schemeClr val="accent1"/>
+              </a:solidFill>
+            </a:endParaRPr>
+          </a:p>
+        </p:txBody>
+      </p:sp>
+      <p:sp>
+        <p:nvSpPr>
+          <p:cNvPr id="12" name="正方形/長方形 11"/>
+          <p:cNvSpPr/>
+          <p:nvPr/>
+        </p:nvSpPr>
+        <p:spPr>
+          <a:xfrm>
+            <a:off x="8760297" y="908720"/>
+            <a:ext cx="1152127" cy="432048"/>
+          </a:xfrm>
+          <a:prstGeom prst="rect">
+            <a:avLst/>
+          </a:prstGeom>
+          <a:solidFill>
+            <a:schemeClr val="accent1"/>
+          </a:solidFill>
+          <a:ln>
+            <a:solidFill>
+              <a:schemeClr val="accent1">
+                <a:lumMod val="50000"/>
+              </a:schemeClr>
+            </a:solidFill>
+          </a:ln>
+        </p:spPr>
+        <p:style>
+          <a:lnRef idx="2">
+            <a:schemeClr val="accent1">
+              <a:shade val="50000"/>
+            </a:schemeClr>
+          </a:lnRef>
+          <a:fillRef idx="1">
+            <a:schemeClr val="accent1"/>
+          </a:fillRef>
+          <a:effectRef idx="0">
+            <a:schemeClr val="accent1"/>
+          </a:effectRef>
+          <a:fontRef idx="minor">
+            <a:schemeClr val="lt1"/>
+          </a:fontRef>
+        </p:style>
+        <p:txBody>
+          <a:bodyPr rtlCol="0" anchor="ctr"/>
+          <a:lstStyle/>
+          <a:p>
+            <a:pPr algn="ctr"/>
+            <a:r>
+              <a:rPr kumimoji="1" lang="en-US" altLang="ja-JP" dirty="0" err="1" smtClean="0"/>
+              <a:t>GainNode</a:t>
+            </a:r>
+            <a:endParaRPr kumimoji="1" lang="ja-JP" altLang="en-US" dirty="0"/>
+          </a:p>
+        </p:txBody>
+      </p:sp>
+      <p:sp>
+        <p:nvSpPr>
+          <p:cNvPr id="13" name="正方形/長方形 12"/>
+          <p:cNvSpPr/>
+          <p:nvPr/>
+        </p:nvSpPr>
+        <p:spPr>
+          <a:xfrm>
+            <a:off x="8760296" y="1340768"/>
+            <a:ext cx="1152127" cy="432048"/>
+          </a:xfrm>
+          <a:prstGeom prst="rect">
+            <a:avLst/>
+          </a:prstGeom>
+          <a:solidFill>
+            <a:schemeClr val="bg1"/>
+          </a:solidFill>
+          <a:ln>
+            <a:solidFill>
+              <a:schemeClr val="accent1">
+                <a:lumMod val="50000"/>
+              </a:schemeClr>
+            </a:solidFill>
+          </a:ln>
+        </p:spPr>
+        <p:style>
+          <a:lnRef idx="2">
+            <a:schemeClr val="accent1">
+              <a:shade val="50000"/>
+            </a:schemeClr>
+          </a:lnRef>
+          <a:fillRef idx="1">
+            <a:schemeClr val="accent1"/>
+          </a:fillRef>
+          <a:effectRef idx="0">
+            <a:schemeClr val="accent1"/>
+          </a:effectRef>
+          <a:fontRef idx="minor">
+            <a:schemeClr val="lt1"/>
+          </a:fontRef>
+        </p:style>
+        <p:txBody>
+          <a:bodyPr rtlCol="0" anchor="ctr"/>
+          <a:lstStyle/>
+          <a:p>
+            <a:r>
+              <a:rPr kumimoji="1" lang="en-US" altLang="ja-JP" dirty="0" smtClean="0">
+                <a:solidFill>
+                  <a:schemeClr val="accent1"/>
+                </a:solidFill>
+              </a:rPr>
+              <a:t>gain (mix)</a:t>
+            </a:r>
+            <a:endParaRPr kumimoji="1" lang="ja-JP" altLang="en-US" dirty="0">
+              <a:solidFill>
+                <a:schemeClr val="accent1"/>
+              </a:solidFill>
+            </a:endParaRPr>
+          </a:p>
+        </p:txBody>
+      </p:sp>
+      <p:sp>
+        <p:nvSpPr>
+          <p:cNvPr id="17" name="正方形/長方形 16"/>
+          <p:cNvSpPr/>
+          <p:nvPr/>
+        </p:nvSpPr>
+        <p:spPr>
+          <a:xfrm>
+            <a:off x="10344472" y="908720"/>
+            <a:ext cx="1152125" cy="432048"/>
+          </a:xfrm>
+          <a:prstGeom prst="rect">
+            <a:avLst/>
+          </a:prstGeom>
+          <a:solidFill>
+            <a:schemeClr val="bg1"/>
+          </a:solidFill>
+          <a:ln>
+            <a:solidFill>
+              <a:schemeClr val="accent1">
+                <a:lumMod val="50000"/>
+              </a:schemeClr>
+            </a:solidFill>
+          </a:ln>
+        </p:spPr>
+        <p:style>
+          <a:lnRef idx="2">
+            <a:schemeClr val="accent1">
+              <a:shade val="50000"/>
+            </a:schemeClr>
+          </a:lnRef>
+          <a:fillRef idx="1">
+            <a:schemeClr val="accent1"/>
+          </a:fillRef>
+          <a:effectRef idx="0">
+            <a:schemeClr val="accent1"/>
+          </a:effectRef>
+          <a:fontRef idx="minor">
+            <a:schemeClr val="lt1"/>
+          </a:fontRef>
+        </p:style>
+        <p:txBody>
+          <a:bodyPr rtlCol="0" anchor="ctr"/>
+          <a:lstStyle/>
+          <a:p>
+            <a:r>
+              <a:rPr kumimoji="1" lang="en-US" altLang="ja-JP" dirty="0" smtClean="0">
+                <a:solidFill>
+                  <a:schemeClr val="accent1"/>
+                </a:solidFill>
+              </a:rPr>
+              <a:t>gain</a:t>
+            </a:r>
+            <a:endParaRPr kumimoji="1" lang="ja-JP" altLang="en-US" dirty="0">
+              <a:solidFill>
+                <a:schemeClr val="accent1"/>
+              </a:solidFill>
+            </a:endParaRPr>
+          </a:p>
+        </p:txBody>
+      </p:sp>
+      <p:cxnSp>
+        <p:nvCxnSpPr>
+          <p:cNvPr id="19" name="直線矢印コネクタ 18"/>
+          <p:cNvCxnSpPr>
+            <a:stCxn id="4" idx="3"/>
+            <a:endCxn id="6" idx="1"/>
+          </p:cNvCxnSpPr>
+          <p:nvPr/>
+        </p:nvCxnSpPr>
+        <p:spPr>
+          <a:xfrm>
+            <a:off x="1991544" y="1628800"/>
+            <a:ext cx="504056" cy="0"/>
+          </a:xfrm>
+          <a:prstGeom prst="straightConnector1">
+            <a:avLst/>
+          </a:prstGeom>
+          <a:ln w="76200">
+            <a:solidFill>
+              <a:schemeClr val="accent1"/>
+            </a:solidFill>
+            <a:tailEnd type="triangle"/>
+          </a:ln>
+        </p:spPr>
+        <p:style>
+          <a:lnRef idx="1">
+            <a:schemeClr val="accent1"/>
+          </a:lnRef>
+          <a:fillRef idx="0">
+            <a:schemeClr val="accent1"/>
+          </a:fillRef>
+          <a:effectRef idx="0">
+            <a:schemeClr val="accent1"/>
+          </a:effectRef>
+          <a:fontRef idx="minor">
+            <a:schemeClr val="tx1"/>
+          </a:fontRef>
+        </p:style>
+      </p:cxnSp>
+      <p:cxnSp>
+        <p:nvCxnSpPr>
+          <p:cNvPr id="66" name="直線矢印コネクタ 65"/>
+          <p:cNvCxnSpPr>
+            <a:endCxn id="4" idx="1"/>
+          </p:cNvCxnSpPr>
+          <p:nvPr/>
+        </p:nvCxnSpPr>
+        <p:spPr>
+          <a:xfrm>
+            <a:off x="119336" y="1628800"/>
+            <a:ext cx="720080" cy="0"/>
+          </a:xfrm>
+          <a:prstGeom prst="straightConnector1">
+            <a:avLst/>
+          </a:prstGeom>
+          <a:ln w="76200">
+            <a:tailEnd type="triangle"/>
+          </a:ln>
+        </p:spPr>
+        <p:style>
+          <a:lnRef idx="1">
+            <a:schemeClr val="accent1"/>
+          </a:lnRef>
+          <a:fillRef idx="0">
+            <a:schemeClr val="accent1"/>
+          </a:fillRef>
+          <a:effectRef idx="0">
+            <a:schemeClr val="accent1"/>
+          </a:effectRef>
+          <a:fontRef idx="minor">
+            <a:schemeClr val="tx1"/>
+          </a:fontRef>
+        </p:style>
+      </p:cxnSp>
+      <p:cxnSp>
+        <p:nvCxnSpPr>
+          <p:cNvPr id="68" name="直線矢印コネクタ 67"/>
+          <p:cNvCxnSpPr/>
+          <p:nvPr/>
+        </p:nvCxnSpPr>
+        <p:spPr>
+          <a:xfrm>
+            <a:off x="11496600" y="692696"/>
+            <a:ext cx="504056" cy="0"/>
+          </a:xfrm>
+          <a:prstGeom prst="straightConnector1">
+            <a:avLst/>
+          </a:prstGeom>
+          <a:ln w="76200">
+            <a:tailEnd type="triangle"/>
+          </a:ln>
+        </p:spPr>
+        <p:style>
+          <a:lnRef idx="1">
+            <a:schemeClr val="accent1"/>
+          </a:lnRef>
+          <a:fillRef idx="0">
+            <a:schemeClr val="accent1"/>
+          </a:fillRef>
+          <a:effectRef idx="0">
+            <a:schemeClr val="accent1"/>
+          </a:effectRef>
+          <a:fontRef idx="minor">
+            <a:schemeClr val="tx1"/>
+          </a:fontRef>
+        </p:style>
+      </p:cxnSp>
+      <p:cxnSp>
+        <p:nvCxnSpPr>
+          <p:cNvPr id="89" name="カギ線コネクタ 88"/>
+          <p:cNvCxnSpPr>
+            <a:stCxn id="10" idx="3"/>
+            <a:endCxn id="128" idx="3"/>
+          </p:cNvCxnSpPr>
+          <p:nvPr/>
+        </p:nvCxnSpPr>
+        <p:spPr>
+          <a:xfrm flipH="1">
+            <a:off x="2351584" y="2420888"/>
+            <a:ext cx="5544615" cy="972108"/>
+          </a:xfrm>
+          <a:prstGeom prst="bentConnector3">
+            <a:avLst>
+              <a:gd name="adj1" fmla="val -4123"/>
+            </a:avLst>
+          </a:prstGeom>
+          <a:ln w="76200">
+            <a:headEnd type="none" w="med" len="med"/>
+            <a:tailEnd type="none" w="med" len="med"/>
+          </a:ln>
+        </p:spPr>
+        <p:style>
+          <a:lnRef idx="1">
+            <a:schemeClr val="accent1"/>
+          </a:lnRef>
+          <a:fillRef idx="0">
+            <a:schemeClr val="accent1"/>
+          </a:fillRef>
+          <a:effectRef idx="0">
+            <a:schemeClr val="accent1"/>
+          </a:effectRef>
+          <a:fontRef idx="minor">
+            <a:schemeClr val="tx1"/>
+          </a:fontRef>
+        </p:style>
+      </p:cxnSp>
+      <p:sp>
+        <p:nvSpPr>
+          <p:cNvPr id="124" name="正方形/長方形 123"/>
+          <p:cNvSpPr/>
+          <p:nvPr/>
+        </p:nvSpPr>
+        <p:spPr>
+          <a:xfrm>
+            <a:off x="4367808" y="5229200"/>
+            <a:ext cx="2448270" cy="432048"/>
+          </a:xfrm>
+          <a:prstGeom prst="rect">
+            <a:avLst/>
+          </a:prstGeom>
+          <a:ln>
+            <a:solidFill>
+              <a:schemeClr val="accent1">
+                <a:lumMod val="50000"/>
+              </a:schemeClr>
+            </a:solidFill>
+          </a:ln>
+        </p:spPr>
+        <p:style>
+          <a:lnRef idx="2">
+            <a:schemeClr val="accent1">
+              <a:shade val="50000"/>
+            </a:schemeClr>
+          </a:lnRef>
+          <a:fillRef idx="1">
+            <a:schemeClr val="accent1"/>
+          </a:fillRef>
+          <a:effectRef idx="0">
+            <a:schemeClr val="accent1"/>
+          </a:effectRef>
+          <a:fontRef idx="minor">
+            <a:schemeClr val="lt1"/>
+          </a:fontRef>
+        </p:style>
+        <p:txBody>
+          <a:bodyPr rtlCol="0" anchor="ctr"/>
+          <a:lstStyle/>
+          <a:p>
+            <a:pPr algn="ctr"/>
+            <a:r>
+              <a:rPr kumimoji="1" lang="en-US" altLang="ja-JP" dirty="0" err="1" smtClean="0"/>
+              <a:t>MyPingPongDelayNode</a:t>
+            </a:r>
+            <a:endParaRPr kumimoji="1" lang="ja-JP" altLang="en-US" dirty="0"/>
+          </a:p>
+        </p:txBody>
+      </p:sp>
+      <p:sp>
+        <p:nvSpPr>
+          <p:cNvPr id="125" name="正方形/長方形 124"/>
+          <p:cNvSpPr/>
+          <p:nvPr/>
+        </p:nvSpPr>
+        <p:spPr>
+          <a:xfrm>
+            <a:off x="4367808" y="5661248"/>
+            <a:ext cx="2448270" cy="1008112"/>
+          </a:xfrm>
+          <a:prstGeom prst="rect">
+            <a:avLst/>
+          </a:prstGeom>
+          <a:solidFill>
+            <a:schemeClr val="bg1"/>
+          </a:solidFill>
+          <a:ln>
+            <a:solidFill>
+              <a:schemeClr val="accent1">
+                <a:lumMod val="50000"/>
+              </a:schemeClr>
+            </a:solidFill>
+          </a:ln>
+        </p:spPr>
+        <p:style>
+          <a:lnRef idx="2">
+            <a:schemeClr val="accent1">
+              <a:shade val="50000"/>
+            </a:schemeClr>
+          </a:lnRef>
+          <a:fillRef idx="1">
+            <a:schemeClr val="accent1"/>
+          </a:fillRef>
+          <a:effectRef idx="0">
+            <a:schemeClr val="accent1"/>
+          </a:effectRef>
+          <a:fontRef idx="minor">
+            <a:schemeClr val="lt1"/>
+          </a:fontRef>
+        </p:style>
+        <p:txBody>
+          <a:bodyPr rtlCol="0" anchor="ctr"/>
+          <a:lstStyle/>
+          <a:p>
+            <a:r>
+              <a:rPr lang="en-US" altLang="ja-JP" dirty="0" err="1" smtClean="0">
+                <a:solidFill>
+                  <a:schemeClr val="accent1"/>
+                </a:solidFill>
+              </a:rPr>
+              <a:t>delayTime</a:t>
+            </a:r>
+            <a:endParaRPr lang="en-US" altLang="ja-JP" dirty="0" smtClean="0">
+              <a:solidFill>
+                <a:schemeClr val="accent1"/>
+              </a:solidFill>
+            </a:endParaRPr>
+          </a:p>
+          <a:p>
+            <a:r>
+              <a:rPr kumimoji="1" lang="en-US" altLang="ja-JP" dirty="0" smtClean="0">
+                <a:solidFill>
+                  <a:schemeClr val="accent1"/>
+                </a:solidFill>
+              </a:rPr>
+              <a:t>feedback</a:t>
+            </a:r>
+          </a:p>
+          <a:p>
+            <a:r>
+              <a:rPr lang="en-US" altLang="ja-JP" dirty="0" smtClean="0">
+                <a:solidFill>
+                  <a:schemeClr val="accent1"/>
+                </a:solidFill>
+              </a:rPr>
+              <a:t>mix</a:t>
+            </a:r>
+            <a:endParaRPr kumimoji="1" lang="ja-JP" altLang="en-US" dirty="0">
+              <a:solidFill>
+                <a:schemeClr val="accent1"/>
+              </a:solidFill>
+            </a:endParaRPr>
+          </a:p>
+        </p:txBody>
+      </p:sp>
+      <p:sp>
+        <p:nvSpPr>
+          <p:cNvPr id="126" name="下矢印 125"/>
+          <p:cNvSpPr/>
+          <p:nvPr/>
+        </p:nvSpPr>
+        <p:spPr>
+          <a:xfrm>
+            <a:off x="5159896" y="4581128"/>
+            <a:ext cx="864096" cy="504056"/>
+          </a:xfrm>
+          <a:prstGeom prst="downArrow">
+            <a:avLst/>
+          </a:prstGeom>
+          <a:solidFill>
+            <a:schemeClr val="accent2"/>
+          </a:solidFill>
+        </p:spPr>
+        <p:style>
+          <a:lnRef idx="2">
+            <a:schemeClr val="accent1">
+              <a:shade val="50000"/>
+            </a:schemeClr>
+          </a:lnRef>
+          <a:fillRef idx="1">
+            <a:schemeClr val="accent1"/>
+          </a:fillRef>
+          <a:effectRef idx="0">
+            <a:schemeClr val="accent1"/>
+          </a:effectRef>
+          <a:fontRef idx="minor">
+            <a:schemeClr val="lt1"/>
+          </a:fontRef>
+        </p:style>
+        <p:txBody>
+          <a:bodyPr rtlCol="0" anchor="ctr"/>
+          <a:lstStyle/>
+          <a:p>
+            <a:pPr algn="ctr"/>
+            <a:endParaRPr kumimoji="1" lang="ja-JP" altLang="en-US"/>
+          </a:p>
+        </p:txBody>
+      </p:sp>
+      <p:sp>
+        <p:nvSpPr>
+          <p:cNvPr id="35" name="正方形/長方形 34"/>
+          <p:cNvSpPr/>
+          <p:nvPr/>
+        </p:nvSpPr>
+        <p:spPr>
+          <a:xfrm>
+            <a:off x="4223792" y="1412776"/>
+            <a:ext cx="1368149" cy="432048"/>
+          </a:xfrm>
+          <a:prstGeom prst="rect">
+            <a:avLst/>
+          </a:prstGeom>
+          <a:ln>
+            <a:solidFill>
+              <a:schemeClr val="accent1">
+                <a:lumMod val="50000"/>
+              </a:schemeClr>
+            </a:solidFill>
+          </a:ln>
+        </p:spPr>
+        <p:style>
+          <a:lnRef idx="2">
+            <a:schemeClr val="accent1">
+              <a:shade val="50000"/>
+            </a:schemeClr>
+          </a:lnRef>
+          <a:fillRef idx="1">
+            <a:schemeClr val="accent1"/>
+          </a:fillRef>
+          <a:effectRef idx="0">
+            <a:schemeClr val="accent1"/>
+          </a:effectRef>
+          <a:fontRef idx="minor">
+            <a:schemeClr val="lt1"/>
+          </a:fontRef>
+        </p:style>
+        <p:txBody>
+          <a:bodyPr rtlCol="0" anchor="ctr"/>
+          <a:lstStyle/>
+          <a:p>
+            <a:pPr algn="ctr"/>
+            <a:r>
+              <a:rPr kumimoji="1" lang="en-US" altLang="ja-JP" dirty="0" err="1" smtClean="0"/>
+              <a:t>DelayNode</a:t>
+            </a:r>
+            <a:endParaRPr kumimoji="1" lang="ja-JP" altLang="en-US" dirty="0"/>
+          </a:p>
+        </p:txBody>
+      </p:sp>
+      <p:sp>
+        <p:nvSpPr>
+          <p:cNvPr id="36" name="正方形/長方形 35"/>
+          <p:cNvSpPr/>
+          <p:nvPr/>
+        </p:nvSpPr>
+        <p:spPr>
+          <a:xfrm>
+            <a:off x="4223792" y="1844824"/>
+            <a:ext cx="1368149" cy="432048"/>
+          </a:xfrm>
+          <a:prstGeom prst="rect">
+            <a:avLst/>
+          </a:prstGeom>
+          <a:solidFill>
+            <a:schemeClr val="bg1"/>
+          </a:solidFill>
+          <a:ln>
+            <a:solidFill>
+              <a:schemeClr val="accent1">
+                <a:lumMod val="50000"/>
+              </a:schemeClr>
+            </a:solidFill>
+          </a:ln>
+        </p:spPr>
+        <p:style>
+          <a:lnRef idx="2">
+            <a:schemeClr val="accent1">
+              <a:shade val="50000"/>
+            </a:schemeClr>
+          </a:lnRef>
+          <a:fillRef idx="1">
+            <a:schemeClr val="accent1"/>
+          </a:fillRef>
+          <a:effectRef idx="0">
+            <a:schemeClr val="accent1"/>
+          </a:effectRef>
+          <a:fontRef idx="minor">
+            <a:schemeClr val="lt1"/>
+          </a:fontRef>
+        </p:style>
+        <p:txBody>
+          <a:bodyPr rtlCol="0" anchor="ctr"/>
+          <a:lstStyle/>
+          <a:p>
+            <a:r>
+              <a:rPr lang="en-US" altLang="ja-JP" dirty="0" err="1" smtClean="0">
+                <a:solidFill>
+                  <a:schemeClr val="accent1"/>
+                </a:solidFill>
+              </a:rPr>
+              <a:t>delayTime</a:t>
+            </a:r>
+            <a:endParaRPr kumimoji="1" lang="ja-JP" altLang="en-US" dirty="0">
+              <a:solidFill>
+                <a:schemeClr val="accent1"/>
+              </a:solidFill>
+            </a:endParaRPr>
+          </a:p>
+        </p:txBody>
+      </p:sp>
+      <p:cxnSp>
+        <p:nvCxnSpPr>
+          <p:cNvPr id="32" name="直線矢印コネクタ 31"/>
+          <p:cNvCxnSpPr>
+            <a:stCxn id="6" idx="3"/>
+            <a:endCxn id="35" idx="1"/>
+          </p:cNvCxnSpPr>
+          <p:nvPr/>
+        </p:nvCxnSpPr>
+        <p:spPr>
+          <a:xfrm>
+            <a:off x="3863749" y="1628800"/>
+            <a:ext cx="360043" cy="0"/>
+          </a:xfrm>
+          <a:prstGeom prst="straightConnector1">
+            <a:avLst/>
+          </a:prstGeom>
+          <a:ln w="76200">
+            <a:tailEnd type="triangle"/>
+          </a:ln>
+        </p:spPr>
+        <p:style>
+          <a:lnRef idx="1">
+            <a:schemeClr val="accent1"/>
+          </a:lnRef>
+          <a:fillRef idx="0">
+            <a:schemeClr val="accent1"/>
+          </a:fillRef>
+          <a:effectRef idx="0">
+            <a:schemeClr val="accent1"/>
+          </a:effectRef>
+          <a:fontRef idx="minor">
+            <a:schemeClr val="tx1"/>
+          </a:fontRef>
+        </p:style>
+      </p:cxnSp>
+      <p:sp>
+        <p:nvSpPr>
+          <p:cNvPr id="41" name="正方形/長方形 40"/>
+          <p:cNvSpPr/>
+          <p:nvPr/>
+        </p:nvSpPr>
+        <p:spPr>
+          <a:xfrm>
+            <a:off x="10344469" y="476672"/>
+            <a:ext cx="1153796" cy="432048"/>
+          </a:xfrm>
+          <a:custGeom>
+            <a:avLst/>
+            <a:gdLst>
+              <a:gd name="connsiteX0" fmla="*/ 0 w 1440160"/>
+              <a:gd name="connsiteY0" fmla="*/ 0 h 432048"/>
+              <a:gd name="connsiteX1" fmla="*/ 1440160 w 1440160"/>
+              <a:gd name="connsiteY1" fmla="*/ 0 h 432048"/>
+              <a:gd name="connsiteX2" fmla="*/ 1440160 w 1440160"/>
+              <a:gd name="connsiteY2" fmla="*/ 432048 h 432048"/>
+              <a:gd name="connsiteX3" fmla="*/ 0 w 1440160"/>
+              <a:gd name="connsiteY3" fmla="*/ 432048 h 432048"/>
+              <a:gd name="connsiteX4" fmla="*/ 0 w 1440160"/>
+              <a:gd name="connsiteY4" fmla="*/ 0 h 432048"/>
+              <a:gd name="connsiteX0" fmla="*/ 4018 w 1444178"/>
+              <a:gd name="connsiteY0" fmla="*/ 0 h 432048"/>
+              <a:gd name="connsiteX1" fmla="*/ 1444178 w 1444178"/>
+              <a:gd name="connsiteY1" fmla="*/ 0 h 432048"/>
+              <a:gd name="connsiteX2" fmla="*/ 1444178 w 1444178"/>
+              <a:gd name="connsiteY2" fmla="*/ 432048 h 432048"/>
+              <a:gd name="connsiteX3" fmla="*/ 4018 w 1444178"/>
+              <a:gd name="connsiteY3" fmla="*/ 432048 h 432048"/>
+              <a:gd name="connsiteX4" fmla="*/ 0 w 1444178"/>
+              <a:gd name="connsiteY4" fmla="*/ 114275 h 432048"/>
+              <a:gd name="connsiteX5" fmla="*/ 4018 w 1444178"/>
+              <a:gd name="connsiteY5" fmla="*/ 0 h 432048"/>
+              <a:gd name="connsiteX0" fmla="*/ 106810 w 1546970"/>
+              <a:gd name="connsiteY0" fmla="*/ 0 h 432048"/>
+              <a:gd name="connsiteX1" fmla="*/ 1546970 w 1546970"/>
+              <a:gd name="connsiteY1" fmla="*/ 0 h 432048"/>
+              <a:gd name="connsiteX2" fmla="*/ 1546970 w 1546970"/>
+              <a:gd name="connsiteY2" fmla="*/ 432048 h 432048"/>
+              <a:gd name="connsiteX3" fmla="*/ 106810 w 1546970"/>
+              <a:gd name="connsiteY3" fmla="*/ 432048 h 432048"/>
+              <a:gd name="connsiteX4" fmla="*/ 105967 w 1546970"/>
+              <a:gd name="connsiteY4" fmla="*/ 342875 h 432048"/>
+              <a:gd name="connsiteX5" fmla="*/ 102792 w 1546970"/>
+              <a:gd name="connsiteY5" fmla="*/ 114275 h 432048"/>
+              <a:gd name="connsiteX6" fmla="*/ 106810 w 1546970"/>
+              <a:gd name="connsiteY6" fmla="*/ 0 h 432048"/>
+              <a:gd name="connsiteX0" fmla="*/ 106810 w 1546970"/>
+              <a:gd name="connsiteY0" fmla="*/ 0 h 432048"/>
+              <a:gd name="connsiteX1" fmla="*/ 1546970 w 1546970"/>
+              <a:gd name="connsiteY1" fmla="*/ 0 h 432048"/>
+              <a:gd name="connsiteX2" fmla="*/ 1546970 w 1546970"/>
+              <a:gd name="connsiteY2" fmla="*/ 432048 h 432048"/>
+              <a:gd name="connsiteX3" fmla="*/ 106810 w 1546970"/>
+              <a:gd name="connsiteY3" fmla="*/ 432048 h 432048"/>
+              <a:gd name="connsiteX4" fmla="*/ 105967 w 1546970"/>
+              <a:gd name="connsiteY4" fmla="*/ 342875 h 432048"/>
+              <a:gd name="connsiteX5" fmla="*/ 102792 w 1546970"/>
+              <a:gd name="connsiteY5" fmla="*/ 212700 h 432048"/>
+              <a:gd name="connsiteX6" fmla="*/ 102792 w 1546970"/>
+              <a:gd name="connsiteY6" fmla="*/ 114275 h 432048"/>
+              <a:gd name="connsiteX7" fmla="*/ 106810 w 1546970"/>
+              <a:gd name="connsiteY7" fmla="*/ 0 h 432048"/>
+              <a:gd name="connsiteX0" fmla="*/ 106810 w 1546970"/>
+              <a:gd name="connsiteY0" fmla="*/ 0 h 432048"/>
+              <a:gd name="connsiteX1" fmla="*/ 1546970 w 1546970"/>
+              <a:gd name="connsiteY1" fmla="*/ 0 h 432048"/>
+              <a:gd name="connsiteX2" fmla="*/ 1546970 w 1546970"/>
+              <a:gd name="connsiteY2" fmla="*/ 432048 h 432048"/>
+              <a:gd name="connsiteX3" fmla="*/ 106810 w 1546970"/>
+              <a:gd name="connsiteY3" fmla="*/ 432048 h 432048"/>
+              <a:gd name="connsiteX4" fmla="*/ 105967 w 1546970"/>
+              <a:gd name="connsiteY4" fmla="*/ 342875 h 432048"/>
+              <a:gd name="connsiteX5" fmla="*/ 102792 w 1546970"/>
+              <a:gd name="connsiteY5" fmla="*/ 212700 h 432048"/>
+              <a:gd name="connsiteX6" fmla="*/ 102792 w 1546970"/>
+              <a:gd name="connsiteY6" fmla="*/ 114275 h 432048"/>
+              <a:gd name="connsiteX7" fmla="*/ 106810 w 1546970"/>
+              <a:gd name="connsiteY7" fmla="*/ 0 h 432048"/>
+              <a:gd name="connsiteX0" fmla="*/ 4470 w 1444630"/>
+              <a:gd name="connsiteY0" fmla="*/ 0 h 432048"/>
+              <a:gd name="connsiteX1" fmla="*/ 1444630 w 1444630"/>
+              <a:gd name="connsiteY1" fmla="*/ 0 h 432048"/>
+              <a:gd name="connsiteX2" fmla="*/ 1444630 w 1444630"/>
+              <a:gd name="connsiteY2" fmla="*/ 432048 h 432048"/>
+              <a:gd name="connsiteX3" fmla="*/ 4470 w 1444630"/>
+              <a:gd name="connsiteY3" fmla="*/ 432048 h 432048"/>
+              <a:gd name="connsiteX4" fmla="*/ 3627 w 1444630"/>
+              <a:gd name="connsiteY4" fmla="*/ 342875 h 432048"/>
+              <a:gd name="connsiteX5" fmla="*/ 452 w 1444630"/>
+              <a:gd name="connsiteY5" fmla="*/ 212700 h 432048"/>
+              <a:gd name="connsiteX6" fmla="*/ 452 w 1444630"/>
+              <a:gd name="connsiteY6" fmla="*/ 114275 h 432048"/>
+              <a:gd name="connsiteX7" fmla="*/ 4470 w 1444630"/>
+              <a:gd name="connsiteY7" fmla="*/ 0 h 432048"/>
+              <a:gd name="connsiteX0" fmla="*/ 4470 w 1444630"/>
+              <a:gd name="connsiteY0" fmla="*/ 0 h 432048"/>
+              <a:gd name="connsiteX1" fmla="*/ 1444630 w 1444630"/>
+              <a:gd name="connsiteY1" fmla="*/ 0 h 432048"/>
+              <a:gd name="connsiteX2" fmla="*/ 1444630 w 1444630"/>
+              <a:gd name="connsiteY2" fmla="*/ 432048 h 432048"/>
+              <a:gd name="connsiteX3" fmla="*/ 4470 w 1444630"/>
+              <a:gd name="connsiteY3" fmla="*/ 432048 h 432048"/>
+              <a:gd name="connsiteX4" fmla="*/ 3627 w 1444630"/>
+              <a:gd name="connsiteY4" fmla="*/ 342875 h 432048"/>
+              <a:gd name="connsiteX5" fmla="*/ 452 w 1444630"/>
+              <a:gd name="connsiteY5" fmla="*/ 212700 h 432048"/>
+              <a:gd name="connsiteX6" fmla="*/ 452 w 1444630"/>
+              <a:gd name="connsiteY6" fmla="*/ 114275 h 432048"/>
+              <a:gd name="connsiteX7" fmla="*/ 4470 w 1444630"/>
+              <a:gd name="connsiteY7" fmla="*/ 0 h 432048"/>
+              <a:gd name="connsiteX0" fmla="*/ 4102 w 1444262"/>
+              <a:gd name="connsiteY0" fmla="*/ 0 h 432048"/>
+              <a:gd name="connsiteX1" fmla="*/ 1444262 w 1444262"/>
+              <a:gd name="connsiteY1" fmla="*/ 0 h 432048"/>
+              <a:gd name="connsiteX2" fmla="*/ 1444262 w 1444262"/>
+              <a:gd name="connsiteY2" fmla="*/ 432048 h 432048"/>
+              <a:gd name="connsiteX3" fmla="*/ 4102 w 1444262"/>
+              <a:gd name="connsiteY3" fmla="*/ 432048 h 432048"/>
+              <a:gd name="connsiteX4" fmla="*/ 3259 w 1444262"/>
+              <a:gd name="connsiteY4" fmla="*/ 342875 h 432048"/>
+              <a:gd name="connsiteX5" fmla="*/ 84 w 1444262"/>
+              <a:gd name="connsiteY5" fmla="*/ 212700 h 432048"/>
+              <a:gd name="connsiteX6" fmla="*/ 84 w 1444262"/>
+              <a:gd name="connsiteY6" fmla="*/ 114275 h 432048"/>
+              <a:gd name="connsiteX7" fmla="*/ 4102 w 1444262"/>
+              <a:gd name="connsiteY7" fmla="*/ 0 h 432048"/>
+              <a:gd name="connsiteX0" fmla="*/ 4036 w 1444196"/>
+              <a:gd name="connsiteY0" fmla="*/ 0 h 432048"/>
+              <a:gd name="connsiteX1" fmla="*/ 1444196 w 1444196"/>
+              <a:gd name="connsiteY1" fmla="*/ 0 h 432048"/>
+              <a:gd name="connsiteX2" fmla="*/ 1444196 w 1444196"/>
+              <a:gd name="connsiteY2" fmla="*/ 432048 h 432048"/>
+              <a:gd name="connsiteX3" fmla="*/ 4036 w 1444196"/>
+              <a:gd name="connsiteY3" fmla="*/ 432048 h 432048"/>
+              <a:gd name="connsiteX4" fmla="*/ 3193 w 1444196"/>
+              <a:gd name="connsiteY4" fmla="*/ 342875 h 432048"/>
+              <a:gd name="connsiteX5" fmla="*/ 18 w 1444196"/>
+              <a:gd name="connsiteY5" fmla="*/ 212700 h 432048"/>
+              <a:gd name="connsiteX6" fmla="*/ 18 w 1444196"/>
+              <a:gd name="connsiteY6" fmla="*/ 114275 h 432048"/>
+              <a:gd name="connsiteX7" fmla="*/ 4036 w 1444196"/>
+              <a:gd name="connsiteY7" fmla="*/ 0 h 432048"/>
+              <a:gd name="connsiteX0" fmla="*/ 4101 w 1444261"/>
+              <a:gd name="connsiteY0" fmla="*/ 0 h 432048"/>
+              <a:gd name="connsiteX1" fmla="*/ 1444261 w 1444261"/>
+              <a:gd name="connsiteY1" fmla="*/ 0 h 432048"/>
+              <a:gd name="connsiteX2" fmla="*/ 1444261 w 1444261"/>
+              <a:gd name="connsiteY2" fmla="*/ 432048 h 432048"/>
+              <a:gd name="connsiteX3" fmla="*/ 4101 w 1444261"/>
+              <a:gd name="connsiteY3" fmla="*/ 432048 h 432048"/>
+              <a:gd name="connsiteX4" fmla="*/ 3258 w 1444261"/>
+              <a:gd name="connsiteY4" fmla="*/ 342875 h 432048"/>
+              <a:gd name="connsiteX5" fmla="*/ 83 w 1444261"/>
+              <a:gd name="connsiteY5" fmla="*/ 212700 h 432048"/>
+              <a:gd name="connsiteX6" fmla="*/ 83 w 1444261"/>
+              <a:gd name="connsiteY6" fmla="*/ 114275 h 432048"/>
+              <a:gd name="connsiteX7" fmla="*/ 4101 w 1444261"/>
+              <a:gd name="connsiteY7" fmla="*/ 0 h 432048"/>
+              <a:gd name="connsiteX0" fmla="*/ 4469 w 1444629"/>
+              <a:gd name="connsiteY0" fmla="*/ 0 h 432048"/>
+              <a:gd name="connsiteX1" fmla="*/ 1444629 w 1444629"/>
+              <a:gd name="connsiteY1" fmla="*/ 0 h 432048"/>
+              <a:gd name="connsiteX2" fmla="*/ 1444629 w 1444629"/>
+              <a:gd name="connsiteY2" fmla="*/ 432048 h 432048"/>
+              <a:gd name="connsiteX3" fmla="*/ 4469 w 1444629"/>
+              <a:gd name="connsiteY3" fmla="*/ 432048 h 432048"/>
+              <a:gd name="connsiteX4" fmla="*/ 3626 w 1444629"/>
+              <a:gd name="connsiteY4" fmla="*/ 342875 h 432048"/>
+              <a:gd name="connsiteX5" fmla="*/ 451 w 1444629"/>
+              <a:gd name="connsiteY5" fmla="*/ 212700 h 432048"/>
+              <a:gd name="connsiteX6" fmla="*/ 451 w 1444629"/>
+              <a:gd name="connsiteY6" fmla="*/ 114275 h 432048"/>
+              <a:gd name="connsiteX7" fmla="*/ 4469 w 1444629"/>
+              <a:gd name="connsiteY7" fmla="*/ 0 h 432048"/>
+              <a:gd name="connsiteX0" fmla="*/ 4061 w 1444221"/>
+              <a:gd name="connsiteY0" fmla="*/ 0 h 432048"/>
+              <a:gd name="connsiteX1" fmla="*/ 1444221 w 1444221"/>
+              <a:gd name="connsiteY1" fmla="*/ 0 h 432048"/>
+              <a:gd name="connsiteX2" fmla="*/ 1444221 w 1444221"/>
+              <a:gd name="connsiteY2" fmla="*/ 432048 h 432048"/>
+              <a:gd name="connsiteX3" fmla="*/ 4061 w 1444221"/>
+              <a:gd name="connsiteY3" fmla="*/ 432048 h 432048"/>
+              <a:gd name="connsiteX4" fmla="*/ 3218 w 1444221"/>
+              <a:gd name="connsiteY4" fmla="*/ 342875 h 432048"/>
+              <a:gd name="connsiteX5" fmla="*/ 43 w 1444221"/>
+              <a:gd name="connsiteY5" fmla="*/ 212700 h 432048"/>
+              <a:gd name="connsiteX6" fmla="*/ 43 w 1444221"/>
+              <a:gd name="connsiteY6" fmla="*/ 114275 h 432048"/>
+              <a:gd name="connsiteX7" fmla="*/ 4061 w 1444221"/>
+              <a:gd name="connsiteY7" fmla="*/ 0 h 432048"/>
+              <a:gd name="connsiteX0" fmla="*/ 4469 w 1444629"/>
+              <a:gd name="connsiteY0" fmla="*/ 0 h 432048"/>
+              <a:gd name="connsiteX1" fmla="*/ 1444629 w 1444629"/>
+              <a:gd name="connsiteY1" fmla="*/ 0 h 432048"/>
+              <a:gd name="connsiteX2" fmla="*/ 1444629 w 1444629"/>
+              <a:gd name="connsiteY2" fmla="*/ 432048 h 432048"/>
+              <a:gd name="connsiteX3" fmla="*/ 4469 w 1444629"/>
+              <a:gd name="connsiteY3" fmla="*/ 432048 h 432048"/>
+              <a:gd name="connsiteX4" fmla="*/ 3626 w 1444629"/>
+              <a:gd name="connsiteY4" fmla="*/ 342875 h 432048"/>
+              <a:gd name="connsiteX5" fmla="*/ 451 w 1444629"/>
+              <a:gd name="connsiteY5" fmla="*/ 212700 h 432048"/>
+              <a:gd name="connsiteX6" fmla="*/ 451 w 1444629"/>
+              <a:gd name="connsiteY6" fmla="*/ 114275 h 432048"/>
+              <a:gd name="connsiteX7" fmla="*/ 4469 w 1444629"/>
+              <a:gd name="connsiteY7" fmla="*/ 0 h 432048"/>
+              <a:gd name="connsiteX0" fmla="*/ 4469 w 1444629"/>
+              <a:gd name="connsiteY0" fmla="*/ 0 h 432048"/>
+              <a:gd name="connsiteX1" fmla="*/ 1444629 w 1444629"/>
+              <a:gd name="connsiteY1" fmla="*/ 0 h 432048"/>
+              <a:gd name="connsiteX2" fmla="*/ 1444629 w 1444629"/>
+              <a:gd name="connsiteY2" fmla="*/ 432048 h 432048"/>
+              <a:gd name="connsiteX3" fmla="*/ 4469 w 1444629"/>
+              <a:gd name="connsiteY3" fmla="*/ 432048 h 432048"/>
+              <a:gd name="connsiteX4" fmla="*/ 3626 w 1444629"/>
+              <a:gd name="connsiteY4" fmla="*/ 342875 h 432048"/>
+              <a:gd name="connsiteX5" fmla="*/ 451 w 1444629"/>
+              <a:gd name="connsiteY5" fmla="*/ 212700 h 432048"/>
+              <a:gd name="connsiteX6" fmla="*/ 451 w 1444629"/>
+              <a:gd name="connsiteY6" fmla="*/ 114275 h 432048"/>
+              <a:gd name="connsiteX7" fmla="*/ 4469 w 1444629"/>
+              <a:gd name="connsiteY7" fmla="*/ 0 h 432048"/>
+              <a:gd name="connsiteX0" fmla="*/ 4099 w 1444259"/>
+              <a:gd name="connsiteY0" fmla="*/ 0 h 432048"/>
+              <a:gd name="connsiteX1" fmla="*/ 1444259 w 1444259"/>
+              <a:gd name="connsiteY1" fmla="*/ 0 h 432048"/>
+              <a:gd name="connsiteX2" fmla="*/ 1444259 w 1444259"/>
+              <a:gd name="connsiteY2" fmla="*/ 432048 h 432048"/>
+              <a:gd name="connsiteX3" fmla="*/ 4099 w 1444259"/>
+              <a:gd name="connsiteY3" fmla="*/ 432048 h 432048"/>
+              <a:gd name="connsiteX4" fmla="*/ 3256 w 1444259"/>
+              <a:gd name="connsiteY4" fmla="*/ 342875 h 432048"/>
+              <a:gd name="connsiteX5" fmla="*/ 81 w 1444259"/>
+              <a:gd name="connsiteY5" fmla="*/ 212700 h 432048"/>
+              <a:gd name="connsiteX6" fmla="*/ 2463 w 1444259"/>
+              <a:gd name="connsiteY6" fmla="*/ 116656 h 432048"/>
+              <a:gd name="connsiteX7" fmla="*/ 4099 w 1444259"/>
+              <a:gd name="connsiteY7" fmla="*/ 0 h 432048"/>
+              <a:gd name="connsiteX0" fmla="*/ 2088 w 1442248"/>
+              <a:gd name="connsiteY0" fmla="*/ 0 h 432048"/>
+              <a:gd name="connsiteX1" fmla="*/ 1442248 w 1442248"/>
+              <a:gd name="connsiteY1" fmla="*/ 0 h 432048"/>
+              <a:gd name="connsiteX2" fmla="*/ 1442248 w 1442248"/>
+              <a:gd name="connsiteY2" fmla="*/ 432048 h 432048"/>
+              <a:gd name="connsiteX3" fmla="*/ 2088 w 1442248"/>
+              <a:gd name="connsiteY3" fmla="*/ 432048 h 432048"/>
+              <a:gd name="connsiteX4" fmla="*/ 1245 w 1442248"/>
+              <a:gd name="connsiteY4" fmla="*/ 342875 h 432048"/>
+              <a:gd name="connsiteX5" fmla="*/ 452 w 1442248"/>
+              <a:gd name="connsiteY5" fmla="*/ 212700 h 432048"/>
+              <a:gd name="connsiteX6" fmla="*/ 452 w 1442248"/>
+              <a:gd name="connsiteY6" fmla="*/ 116656 h 432048"/>
+              <a:gd name="connsiteX7" fmla="*/ 2088 w 1442248"/>
+              <a:gd name="connsiteY7" fmla="*/ 0 h 432048"/>
+              <a:gd name="connsiteX0" fmla="*/ 2088 w 1442248"/>
+              <a:gd name="connsiteY0" fmla="*/ 0 h 432048"/>
+              <a:gd name="connsiteX1" fmla="*/ 1442248 w 1442248"/>
+              <a:gd name="connsiteY1" fmla="*/ 0 h 432048"/>
+              <a:gd name="connsiteX2" fmla="*/ 1442248 w 1442248"/>
+              <a:gd name="connsiteY2" fmla="*/ 432048 h 432048"/>
+              <a:gd name="connsiteX3" fmla="*/ 2088 w 1442248"/>
+              <a:gd name="connsiteY3" fmla="*/ 432048 h 432048"/>
+              <a:gd name="connsiteX4" fmla="*/ 1245 w 1442248"/>
+              <a:gd name="connsiteY4" fmla="*/ 342875 h 432048"/>
+              <a:gd name="connsiteX5" fmla="*/ 452 w 1442248"/>
+              <a:gd name="connsiteY5" fmla="*/ 212700 h 432048"/>
+              <a:gd name="connsiteX6" fmla="*/ 452 w 1442248"/>
+              <a:gd name="connsiteY6" fmla="*/ 116656 h 432048"/>
+              <a:gd name="connsiteX7" fmla="*/ 2088 w 1442248"/>
+              <a:gd name="connsiteY7" fmla="*/ 0 h 432048"/>
+              <a:gd name="connsiteX0" fmla="*/ 2088 w 1442248"/>
+              <a:gd name="connsiteY0" fmla="*/ 0 h 432048"/>
+              <a:gd name="connsiteX1" fmla="*/ 1442248 w 1442248"/>
+              <a:gd name="connsiteY1" fmla="*/ 0 h 432048"/>
+              <a:gd name="connsiteX2" fmla="*/ 1442248 w 1442248"/>
+              <a:gd name="connsiteY2" fmla="*/ 432048 h 432048"/>
+              <a:gd name="connsiteX3" fmla="*/ 2088 w 1442248"/>
+              <a:gd name="connsiteY3" fmla="*/ 432048 h 432048"/>
+              <a:gd name="connsiteX4" fmla="*/ 1245 w 1442248"/>
+              <a:gd name="connsiteY4" fmla="*/ 342875 h 432048"/>
+              <a:gd name="connsiteX5" fmla="*/ 452 w 1442248"/>
+              <a:gd name="connsiteY5" fmla="*/ 212700 h 432048"/>
+              <a:gd name="connsiteX6" fmla="*/ 452 w 1442248"/>
+              <a:gd name="connsiteY6" fmla="*/ 116656 h 432048"/>
+              <a:gd name="connsiteX7" fmla="*/ 2088 w 1442248"/>
+              <a:gd name="connsiteY7" fmla="*/ 0 h 432048"/>
+            </a:gdLst>
+            <a:ahLst/>
+            <a:cxnLst>
+              <a:cxn ang="0">
+                <a:pos x="connsiteX0" y="connsiteY0"/>
+              </a:cxn>
+              <a:cxn ang="0">
+                <a:pos x="connsiteX1" y="connsiteY1"/>
+              </a:cxn>
+              <a:cxn ang="0">
+                <a:pos x="connsiteX2" y="connsiteY2"/>
+              </a:cxn>
+              <a:cxn ang="0">
+                <a:pos x="connsiteX3" y="connsiteY3"/>
+              </a:cxn>
+              <a:cxn ang="0">
+                <a:pos x="connsiteX4" y="connsiteY4"/>
+              </a:cxn>
+              <a:cxn ang="0">
+                <a:pos x="connsiteX5" y="connsiteY5"/>
+              </a:cxn>
+              <a:cxn ang="0">
+                <a:pos x="connsiteX6" y="connsiteY6"/>
+              </a:cxn>
+              <a:cxn ang="0">
+                <a:pos x="connsiteX7" y="connsiteY7"/>
+              </a:cxn>
+            </a:cxnLst>
+            <a:rect l="l" t="t" r="r" b="b"/>
+            <a:pathLst>
+              <a:path w="1442248" h="432048">
+                <a:moveTo>
+                  <a:pt x="2088" y="0"/>
+                </a:moveTo>
+                <a:lnTo>
+                  <a:pt x="1442248" y="0"/>
+                </a:lnTo>
+                <a:lnTo>
+                  <a:pt x="1442248" y="432048"/>
+                </a:lnTo>
+                <a:lnTo>
+                  <a:pt x="2088" y="432048"/>
+                </a:lnTo>
+                <a:cubicBezTo>
+                  <a:pt x="3221" y="391786"/>
+                  <a:pt x="1915" y="388694"/>
+                  <a:pt x="1245" y="342875"/>
+                </a:cubicBezTo>
+                <a:cubicBezTo>
+                  <a:pt x="575" y="306317"/>
+                  <a:pt x="981" y="250800"/>
+                  <a:pt x="452" y="212700"/>
+                </a:cubicBezTo>
+                <a:cubicBezTo>
+                  <a:pt x="-77" y="174600"/>
+                  <a:pt x="-218" y="159250"/>
+                  <a:pt x="452" y="116656"/>
+                </a:cubicBezTo>
+                <a:cubicBezTo>
+                  <a:pt x="-591" y="76183"/>
+                  <a:pt x="749" y="38092"/>
+                  <a:pt x="2088" y="0"/>
+                </a:cubicBezTo>
+                <a:close/>
+              </a:path>
+            </a:pathLst>
+          </a:custGeom>
+          <a:ln>
+            <a:solidFill>
+              <a:schemeClr val="accent5">
+                <a:lumMod val="75000"/>
+              </a:schemeClr>
+            </a:solidFill>
+          </a:ln>
+        </p:spPr>
+        <p:style>
+          <a:lnRef idx="2">
+            <a:schemeClr val="accent1">
+              <a:shade val="50000"/>
+            </a:schemeClr>
+          </a:lnRef>
+          <a:fillRef idx="1">
+            <a:schemeClr val="accent1"/>
+          </a:fillRef>
+          <a:effectRef idx="0">
+            <a:schemeClr val="accent1"/>
+          </a:effectRef>
+          <a:fontRef idx="minor">
+            <a:schemeClr val="lt1"/>
+          </a:fontRef>
+        </p:style>
+        <p:txBody>
+          <a:bodyPr rtlCol="0" anchor="ctr"/>
+          <a:lstStyle/>
+          <a:p>
+            <a:pPr algn="ctr"/>
+            <a:r>
+              <a:rPr lang="en-US" altLang="ja-JP"/>
+              <a:t>GainNode</a:t>
+            </a:r>
+            <a:endParaRPr lang="ja-JP" altLang="en-US" dirty="0"/>
+          </a:p>
+        </p:txBody>
+      </p:sp>
+      <p:sp>
+        <p:nvSpPr>
+          <p:cNvPr id="63" name="正方形/長方形 40"/>
+          <p:cNvSpPr/>
+          <p:nvPr/>
+        </p:nvSpPr>
+        <p:spPr>
+          <a:xfrm>
+            <a:off x="6240016" y="908720"/>
+            <a:ext cx="2160240" cy="432048"/>
+          </a:xfrm>
+          <a:custGeom>
+            <a:avLst/>
+            <a:gdLst>
+              <a:gd name="connsiteX0" fmla="*/ 0 w 1440160"/>
+              <a:gd name="connsiteY0" fmla="*/ 0 h 432048"/>
+              <a:gd name="connsiteX1" fmla="*/ 1440160 w 1440160"/>
+              <a:gd name="connsiteY1" fmla="*/ 0 h 432048"/>
+              <a:gd name="connsiteX2" fmla="*/ 1440160 w 1440160"/>
+              <a:gd name="connsiteY2" fmla="*/ 432048 h 432048"/>
+              <a:gd name="connsiteX3" fmla="*/ 0 w 1440160"/>
+              <a:gd name="connsiteY3" fmla="*/ 432048 h 432048"/>
+              <a:gd name="connsiteX4" fmla="*/ 0 w 1440160"/>
+              <a:gd name="connsiteY4" fmla="*/ 0 h 432048"/>
+              <a:gd name="connsiteX0" fmla="*/ 4018 w 1444178"/>
+              <a:gd name="connsiteY0" fmla="*/ 0 h 432048"/>
+              <a:gd name="connsiteX1" fmla="*/ 1444178 w 1444178"/>
+              <a:gd name="connsiteY1" fmla="*/ 0 h 432048"/>
+              <a:gd name="connsiteX2" fmla="*/ 1444178 w 1444178"/>
+              <a:gd name="connsiteY2" fmla="*/ 432048 h 432048"/>
+              <a:gd name="connsiteX3" fmla="*/ 4018 w 1444178"/>
+              <a:gd name="connsiteY3" fmla="*/ 432048 h 432048"/>
+              <a:gd name="connsiteX4" fmla="*/ 0 w 1444178"/>
+              <a:gd name="connsiteY4" fmla="*/ 114275 h 432048"/>
+              <a:gd name="connsiteX5" fmla="*/ 4018 w 1444178"/>
+              <a:gd name="connsiteY5" fmla="*/ 0 h 432048"/>
+              <a:gd name="connsiteX0" fmla="*/ 106810 w 1546970"/>
+              <a:gd name="connsiteY0" fmla="*/ 0 h 432048"/>
+              <a:gd name="connsiteX1" fmla="*/ 1546970 w 1546970"/>
+              <a:gd name="connsiteY1" fmla="*/ 0 h 432048"/>
+              <a:gd name="connsiteX2" fmla="*/ 1546970 w 1546970"/>
+              <a:gd name="connsiteY2" fmla="*/ 432048 h 432048"/>
+              <a:gd name="connsiteX3" fmla="*/ 106810 w 1546970"/>
+              <a:gd name="connsiteY3" fmla="*/ 432048 h 432048"/>
+              <a:gd name="connsiteX4" fmla="*/ 105967 w 1546970"/>
+              <a:gd name="connsiteY4" fmla="*/ 342875 h 432048"/>
+              <a:gd name="connsiteX5" fmla="*/ 102792 w 1546970"/>
+              <a:gd name="connsiteY5" fmla="*/ 114275 h 432048"/>
+              <a:gd name="connsiteX6" fmla="*/ 106810 w 1546970"/>
+              <a:gd name="connsiteY6" fmla="*/ 0 h 432048"/>
+              <a:gd name="connsiteX0" fmla="*/ 106810 w 1546970"/>
+              <a:gd name="connsiteY0" fmla="*/ 0 h 432048"/>
+              <a:gd name="connsiteX1" fmla="*/ 1546970 w 1546970"/>
+              <a:gd name="connsiteY1" fmla="*/ 0 h 432048"/>
+              <a:gd name="connsiteX2" fmla="*/ 1546970 w 1546970"/>
+              <a:gd name="connsiteY2" fmla="*/ 432048 h 432048"/>
+              <a:gd name="connsiteX3" fmla="*/ 106810 w 1546970"/>
+              <a:gd name="connsiteY3" fmla="*/ 432048 h 432048"/>
+              <a:gd name="connsiteX4" fmla="*/ 105967 w 1546970"/>
+              <a:gd name="connsiteY4" fmla="*/ 342875 h 432048"/>
+              <a:gd name="connsiteX5" fmla="*/ 102792 w 1546970"/>
+              <a:gd name="connsiteY5" fmla="*/ 212700 h 432048"/>
+              <a:gd name="connsiteX6" fmla="*/ 102792 w 1546970"/>
+              <a:gd name="connsiteY6" fmla="*/ 114275 h 432048"/>
+              <a:gd name="connsiteX7" fmla="*/ 106810 w 1546970"/>
+              <a:gd name="connsiteY7" fmla="*/ 0 h 432048"/>
+              <a:gd name="connsiteX0" fmla="*/ 106810 w 1546970"/>
+              <a:gd name="connsiteY0" fmla="*/ 0 h 432048"/>
+              <a:gd name="connsiteX1" fmla="*/ 1546970 w 1546970"/>
+              <a:gd name="connsiteY1" fmla="*/ 0 h 432048"/>
+              <a:gd name="connsiteX2" fmla="*/ 1546970 w 1546970"/>
+              <a:gd name="connsiteY2" fmla="*/ 432048 h 432048"/>
+              <a:gd name="connsiteX3" fmla="*/ 106810 w 1546970"/>
+              <a:gd name="connsiteY3" fmla="*/ 432048 h 432048"/>
+              <a:gd name="connsiteX4" fmla="*/ 105967 w 1546970"/>
+              <a:gd name="connsiteY4" fmla="*/ 342875 h 432048"/>
+              <a:gd name="connsiteX5" fmla="*/ 102792 w 1546970"/>
+              <a:gd name="connsiteY5" fmla="*/ 212700 h 432048"/>
+              <a:gd name="connsiteX6" fmla="*/ 102792 w 1546970"/>
+              <a:gd name="connsiteY6" fmla="*/ 114275 h 432048"/>
+              <a:gd name="connsiteX7" fmla="*/ 106810 w 1546970"/>
+              <a:gd name="connsiteY7" fmla="*/ 0 h 432048"/>
+              <a:gd name="connsiteX0" fmla="*/ 4470 w 1444630"/>
+              <a:gd name="connsiteY0" fmla="*/ 0 h 432048"/>
+              <a:gd name="connsiteX1" fmla="*/ 1444630 w 1444630"/>
+              <a:gd name="connsiteY1" fmla="*/ 0 h 432048"/>
+              <a:gd name="connsiteX2" fmla="*/ 1444630 w 1444630"/>
+              <a:gd name="connsiteY2" fmla="*/ 432048 h 432048"/>
+              <a:gd name="connsiteX3" fmla="*/ 4470 w 1444630"/>
+              <a:gd name="connsiteY3" fmla="*/ 432048 h 432048"/>
+              <a:gd name="connsiteX4" fmla="*/ 3627 w 1444630"/>
+              <a:gd name="connsiteY4" fmla="*/ 342875 h 432048"/>
+              <a:gd name="connsiteX5" fmla="*/ 452 w 1444630"/>
+              <a:gd name="connsiteY5" fmla="*/ 212700 h 432048"/>
+              <a:gd name="connsiteX6" fmla="*/ 452 w 1444630"/>
+              <a:gd name="connsiteY6" fmla="*/ 114275 h 432048"/>
+              <a:gd name="connsiteX7" fmla="*/ 4470 w 1444630"/>
+              <a:gd name="connsiteY7" fmla="*/ 0 h 432048"/>
+              <a:gd name="connsiteX0" fmla="*/ 4470 w 1444630"/>
+              <a:gd name="connsiteY0" fmla="*/ 0 h 432048"/>
+              <a:gd name="connsiteX1" fmla="*/ 1444630 w 1444630"/>
+              <a:gd name="connsiteY1" fmla="*/ 0 h 432048"/>
+              <a:gd name="connsiteX2" fmla="*/ 1444630 w 1444630"/>
+              <a:gd name="connsiteY2" fmla="*/ 432048 h 432048"/>
+              <a:gd name="connsiteX3" fmla="*/ 4470 w 1444630"/>
+              <a:gd name="connsiteY3" fmla="*/ 432048 h 432048"/>
+              <a:gd name="connsiteX4" fmla="*/ 3627 w 1444630"/>
+              <a:gd name="connsiteY4" fmla="*/ 342875 h 432048"/>
+              <a:gd name="connsiteX5" fmla="*/ 452 w 1444630"/>
+              <a:gd name="connsiteY5" fmla="*/ 212700 h 432048"/>
+              <a:gd name="connsiteX6" fmla="*/ 452 w 1444630"/>
+              <a:gd name="connsiteY6" fmla="*/ 114275 h 432048"/>
+              <a:gd name="connsiteX7" fmla="*/ 4470 w 1444630"/>
+              <a:gd name="connsiteY7" fmla="*/ 0 h 432048"/>
+              <a:gd name="connsiteX0" fmla="*/ 4102 w 1444262"/>
+              <a:gd name="connsiteY0" fmla="*/ 0 h 432048"/>
+              <a:gd name="connsiteX1" fmla="*/ 1444262 w 1444262"/>
+              <a:gd name="connsiteY1" fmla="*/ 0 h 432048"/>
+              <a:gd name="connsiteX2" fmla="*/ 1444262 w 1444262"/>
+              <a:gd name="connsiteY2" fmla="*/ 432048 h 432048"/>
+              <a:gd name="connsiteX3" fmla="*/ 4102 w 1444262"/>
+              <a:gd name="connsiteY3" fmla="*/ 432048 h 432048"/>
+              <a:gd name="connsiteX4" fmla="*/ 3259 w 1444262"/>
+              <a:gd name="connsiteY4" fmla="*/ 342875 h 432048"/>
+              <a:gd name="connsiteX5" fmla="*/ 84 w 1444262"/>
+              <a:gd name="connsiteY5" fmla="*/ 212700 h 432048"/>
+              <a:gd name="connsiteX6" fmla="*/ 84 w 1444262"/>
+              <a:gd name="connsiteY6" fmla="*/ 114275 h 432048"/>
+              <a:gd name="connsiteX7" fmla="*/ 4102 w 1444262"/>
+              <a:gd name="connsiteY7" fmla="*/ 0 h 432048"/>
+              <a:gd name="connsiteX0" fmla="*/ 4036 w 1444196"/>
+              <a:gd name="connsiteY0" fmla="*/ 0 h 432048"/>
+              <a:gd name="connsiteX1" fmla="*/ 1444196 w 1444196"/>
+              <a:gd name="connsiteY1" fmla="*/ 0 h 432048"/>
+              <a:gd name="connsiteX2" fmla="*/ 1444196 w 1444196"/>
+              <a:gd name="connsiteY2" fmla="*/ 432048 h 432048"/>
+              <a:gd name="connsiteX3" fmla="*/ 4036 w 1444196"/>
+              <a:gd name="connsiteY3" fmla="*/ 432048 h 432048"/>
+              <a:gd name="connsiteX4" fmla="*/ 3193 w 1444196"/>
+              <a:gd name="connsiteY4" fmla="*/ 342875 h 432048"/>
+              <a:gd name="connsiteX5" fmla="*/ 18 w 1444196"/>
+              <a:gd name="connsiteY5" fmla="*/ 212700 h 432048"/>
+              <a:gd name="connsiteX6" fmla="*/ 18 w 1444196"/>
+              <a:gd name="connsiteY6" fmla="*/ 114275 h 432048"/>
+              <a:gd name="connsiteX7" fmla="*/ 4036 w 1444196"/>
+              <a:gd name="connsiteY7" fmla="*/ 0 h 432048"/>
+              <a:gd name="connsiteX0" fmla="*/ 4101 w 1444261"/>
+              <a:gd name="connsiteY0" fmla="*/ 0 h 432048"/>
+              <a:gd name="connsiteX1" fmla="*/ 1444261 w 1444261"/>
+              <a:gd name="connsiteY1" fmla="*/ 0 h 432048"/>
+              <a:gd name="connsiteX2" fmla="*/ 1444261 w 1444261"/>
+              <a:gd name="connsiteY2" fmla="*/ 432048 h 432048"/>
+              <a:gd name="connsiteX3" fmla="*/ 4101 w 1444261"/>
+              <a:gd name="connsiteY3" fmla="*/ 432048 h 432048"/>
+              <a:gd name="connsiteX4" fmla="*/ 3258 w 1444261"/>
+              <a:gd name="connsiteY4" fmla="*/ 342875 h 432048"/>
+              <a:gd name="connsiteX5" fmla="*/ 83 w 1444261"/>
+              <a:gd name="connsiteY5" fmla="*/ 212700 h 432048"/>
+              <a:gd name="connsiteX6" fmla="*/ 83 w 1444261"/>
+              <a:gd name="connsiteY6" fmla="*/ 114275 h 432048"/>
+              <a:gd name="connsiteX7" fmla="*/ 4101 w 1444261"/>
+              <a:gd name="connsiteY7" fmla="*/ 0 h 432048"/>
+              <a:gd name="connsiteX0" fmla="*/ 4469 w 1444629"/>
+              <a:gd name="connsiteY0" fmla="*/ 0 h 432048"/>
+              <a:gd name="connsiteX1" fmla="*/ 1444629 w 1444629"/>
+              <a:gd name="connsiteY1" fmla="*/ 0 h 432048"/>
+              <a:gd name="connsiteX2" fmla="*/ 1444629 w 1444629"/>
+              <a:gd name="connsiteY2" fmla="*/ 432048 h 432048"/>
+              <a:gd name="connsiteX3" fmla="*/ 4469 w 1444629"/>
+              <a:gd name="connsiteY3" fmla="*/ 432048 h 432048"/>
+              <a:gd name="connsiteX4" fmla="*/ 3626 w 1444629"/>
+              <a:gd name="connsiteY4" fmla="*/ 342875 h 432048"/>
+              <a:gd name="connsiteX5" fmla="*/ 451 w 1444629"/>
+              <a:gd name="connsiteY5" fmla="*/ 212700 h 432048"/>
+              <a:gd name="connsiteX6" fmla="*/ 451 w 1444629"/>
+              <a:gd name="connsiteY6" fmla="*/ 114275 h 432048"/>
+              <a:gd name="connsiteX7" fmla="*/ 4469 w 1444629"/>
+              <a:gd name="connsiteY7" fmla="*/ 0 h 432048"/>
+              <a:gd name="connsiteX0" fmla="*/ 4061 w 1444221"/>
+              <a:gd name="connsiteY0" fmla="*/ 0 h 432048"/>
+              <a:gd name="connsiteX1" fmla="*/ 1444221 w 1444221"/>
+              <a:gd name="connsiteY1" fmla="*/ 0 h 432048"/>
+              <a:gd name="connsiteX2" fmla="*/ 1444221 w 1444221"/>
+              <a:gd name="connsiteY2" fmla="*/ 432048 h 432048"/>
+              <a:gd name="connsiteX3" fmla="*/ 4061 w 1444221"/>
+              <a:gd name="connsiteY3" fmla="*/ 432048 h 432048"/>
+              <a:gd name="connsiteX4" fmla="*/ 3218 w 1444221"/>
+              <a:gd name="connsiteY4" fmla="*/ 342875 h 432048"/>
+              <a:gd name="connsiteX5" fmla="*/ 43 w 1444221"/>
+              <a:gd name="connsiteY5" fmla="*/ 212700 h 432048"/>
+              <a:gd name="connsiteX6" fmla="*/ 43 w 1444221"/>
+              <a:gd name="connsiteY6" fmla="*/ 114275 h 432048"/>
+              <a:gd name="connsiteX7" fmla="*/ 4061 w 1444221"/>
+              <a:gd name="connsiteY7" fmla="*/ 0 h 432048"/>
+              <a:gd name="connsiteX0" fmla="*/ 4469 w 1444629"/>
+              <a:gd name="connsiteY0" fmla="*/ 0 h 432048"/>
+              <a:gd name="connsiteX1" fmla="*/ 1444629 w 1444629"/>
+              <a:gd name="connsiteY1" fmla="*/ 0 h 432048"/>
+              <a:gd name="connsiteX2" fmla="*/ 1444629 w 1444629"/>
+              <a:gd name="connsiteY2" fmla="*/ 432048 h 432048"/>
+              <a:gd name="connsiteX3" fmla="*/ 4469 w 1444629"/>
+              <a:gd name="connsiteY3" fmla="*/ 432048 h 432048"/>
+              <a:gd name="connsiteX4" fmla="*/ 3626 w 1444629"/>
+              <a:gd name="connsiteY4" fmla="*/ 342875 h 432048"/>
+              <a:gd name="connsiteX5" fmla="*/ 451 w 1444629"/>
+              <a:gd name="connsiteY5" fmla="*/ 212700 h 432048"/>
+              <a:gd name="connsiteX6" fmla="*/ 451 w 1444629"/>
+              <a:gd name="connsiteY6" fmla="*/ 114275 h 432048"/>
+              <a:gd name="connsiteX7" fmla="*/ 4469 w 1444629"/>
+              <a:gd name="connsiteY7" fmla="*/ 0 h 432048"/>
+              <a:gd name="connsiteX0" fmla="*/ 4469 w 1444629"/>
+              <a:gd name="connsiteY0" fmla="*/ 0 h 432048"/>
+              <a:gd name="connsiteX1" fmla="*/ 1444629 w 1444629"/>
+              <a:gd name="connsiteY1" fmla="*/ 0 h 432048"/>
+              <a:gd name="connsiteX2" fmla="*/ 1444629 w 1444629"/>
+              <a:gd name="connsiteY2" fmla="*/ 432048 h 432048"/>
+              <a:gd name="connsiteX3" fmla="*/ 4469 w 1444629"/>
+              <a:gd name="connsiteY3" fmla="*/ 432048 h 432048"/>
+              <a:gd name="connsiteX4" fmla="*/ 3626 w 1444629"/>
+              <a:gd name="connsiteY4" fmla="*/ 342875 h 432048"/>
+              <a:gd name="connsiteX5" fmla="*/ 451 w 1444629"/>
+              <a:gd name="connsiteY5" fmla="*/ 212700 h 432048"/>
+              <a:gd name="connsiteX6" fmla="*/ 451 w 1444629"/>
+              <a:gd name="connsiteY6" fmla="*/ 114275 h 432048"/>
+              <a:gd name="connsiteX7" fmla="*/ 4469 w 1444629"/>
+              <a:gd name="connsiteY7" fmla="*/ 0 h 432048"/>
+              <a:gd name="connsiteX0" fmla="*/ 4099 w 1444259"/>
+              <a:gd name="connsiteY0" fmla="*/ 0 h 432048"/>
+              <a:gd name="connsiteX1" fmla="*/ 1444259 w 1444259"/>
+              <a:gd name="connsiteY1" fmla="*/ 0 h 432048"/>
+              <a:gd name="connsiteX2" fmla="*/ 1444259 w 1444259"/>
+              <a:gd name="connsiteY2" fmla="*/ 432048 h 432048"/>
+              <a:gd name="connsiteX3" fmla="*/ 4099 w 1444259"/>
+              <a:gd name="connsiteY3" fmla="*/ 432048 h 432048"/>
+              <a:gd name="connsiteX4" fmla="*/ 3256 w 1444259"/>
+              <a:gd name="connsiteY4" fmla="*/ 342875 h 432048"/>
+              <a:gd name="connsiteX5" fmla="*/ 81 w 1444259"/>
+              <a:gd name="connsiteY5" fmla="*/ 212700 h 432048"/>
+              <a:gd name="connsiteX6" fmla="*/ 2463 w 1444259"/>
+              <a:gd name="connsiteY6" fmla="*/ 116656 h 432048"/>
+              <a:gd name="connsiteX7" fmla="*/ 4099 w 1444259"/>
+              <a:gd name="connsiteY7" fmla="*/ 0 h 432048"/>
+              <a:gd name="connsiteX0" fmla="*/ 2088 w 1442248"/>
+              <a:gd name="connsiteY0" fmla="*/ 0 h 432048"/>
+              <a:gd name="connsiteX1" fmla="*/ 1442248 w 1442248"/>
+              <a:gd name="connsiteY1" fmla="*/ 0 h 432048"/>
+              <a:gd name="connsiteX2" fmla="*/ 1442248 w 1442248"/>
+              <a:gd name="connsiteY2" fmla="*/ 432048 h 432048"/>
+              <a:gd name="connsiteX3" fmla="*/ 2088 w 1442248"/>
+              <a:gd name="connsiteY3" fmla="*/ 432048 h 432048"/>
+              <a:gd name="connsiteX4" fmla="*/ 1245 w 1442248"/>
+              <a:gd name="connsiteY4" fmla="*/ 342875 h 432048"/>
+              <a:gd name="connsiteX5" fmla="*/ 452 w 1442248"/>
+              <a:gd name="connsiteY5" fmla="*/ 212700 h 432048"/>
+              <a:gd name="connsiteX6" fmla="*/ 452 w 1442248"/>
+              <a:gd name="connsiteY6" fmla="*/ 116656 h 432048"/>
+              <a:gd name="connsiteX7" fmla="*/ 2088 w 1442248"/>
+              <a:gd name="connsiteY7" fmla="*/ 0 h 432048"/>
+              <a:gd name="connsiteX0" fmla="*/ 2088 w 1442248"/>
+              <a:gd name="connsiteY0" fmla="*/ 0 h 432048"/>
+              <a:gd name="connsiteX1" fmla="*/ 1442248 w 1442248"/>
+              <a:gd name="connsiteY1" fmla="*/ 0 h 432048"/>
+              <a:gd name="connsiteX2" fmla="*/ 1442248 w 1442248"/>
+              <a:gd name="connsiteY2" fmla="*/ 432048 h 432048"/>
+              <a:gd name="connsiteX3" fmla="*/ 2088 w 1442248"/>
+              <a:gd name="connsiteY3" fmla="*/ 432048 h 432048"/>
+              <a:gd name="connsiteX4" fmla="*/ 1245 w 1442248"/>
+              <a:gd name="connsiteY4" fmla="*/ 342875 h 432048"/>
+              <a:gd name="connsiteX5" fmla="*/ 452 w 1442248"/>
+              <a:gd name="connsiteY5" fmla="*/ 212700 h 432048"/>
+              <a:gd name="connsiteX6" fmla="*/ 452 w 1442248"/>
+              <a:gd name="connsiteY6" fmla="*/ 116656 h 432048"/>
+              <a:gd name="connsiteX7" fmla="*/ 2088 w 1442248"/>
+              <a:gd name="connsiteY7" fmla="*/ 0 h 432048"/>
+              <a:gd name="connsiteX0" fmla="*/ 2088 w 1442248"/>
+              <a:gd name="connsiteY0" fmla="*/ 0 h 432048"/>
+              <a:gd name="connsiteX1" fmla="*/ 1442248 w 1442248"/>
+              <a:gd name="connsiteY1" fmla="*/ 0 h 432048"/>
+              <a:gd name="connsiteX2" fmla="*/ 1442248 w 1442248"/>
+              <a:gd name="connsiteY2" fmla="*/ 432048 h 432048"/>
+              <a:gd name="connsiteX3" fmla="*/ 2088 w 1442248"/>
+              <a:gd name="connsiteY3" fmla="*/ 432048 h 432048"/>
+              <a:gd name="connsiteX4" fmla="*/ 1245 w 1442248"/>
+              <a:gd name="connsiteY4" fmla="*/ 342875 h 432048"/>
+              <a:gd name="connsiteX5" fmla="*/ 452 w 1442248"/>
+              <a:gd name="connsiteY5" fmla="*/ 212700 h 432048"/>
+              <a:gd name="connsiteX6" fmla="*/ 452 w 1442248"/>
+              <a:gd name="connsiteY6" fmla="*/ 116656 h 432048"/>
+              <a:gd name="connsiteX7" fmla="*/ 2088 w 1442248"/>
+              <a:gd name="connsiteY7" fmla="*/ 0 h 432048"/>
+            </a:gdLst>
+            <a:ahLst/>
+            <a:cxnLst>
+              <a:cxn ang="0">
+                <a:pos x="connsiteX0" y="connsiteY0"/>
+              </a:cxn>
+              <a:cxn ang="0">
+                <a:pos x="connsiteX1" y="connsiteY1"/>
+              </a:cxn>
+              <a:cxn ang="0">
+                <a:pos x="connsiteX2" y="connsiteY2"/>
+              </a:cxn>
+              <a:cxn ang="0">
+                <a:pos x="connsiteX3" y="connsiteY3"/>
+              </a:cxn>
+              <a:cxn ang="0">
+                <a:pos x="connsiteX4" y="connsiteY4"/>
+              </a:cxn>
+              <a:cxn ang="0">
+                <a:pos x="connsiteX5" y="connsiteY5"/>
+              </a:cxn>
+              <a:cxn ang="0">
+                <a:pos x="connsiteX6" y="connsiteY6"/>
+              </a:cxn>
+              <a:cxn ang="0">
+                <a:pos x="connsiteX7" y="connsiteY7"/>
+              </a:cxn>
+            </a:cxnLst>
+            <a:rect l="l" t="t" r="r" b="b"/>
+            <a:pathLst>
+              <a:path w="1442248" h="432048">
+                <a:moveTo>
+                  <a:pt x="2088" y="0"/>
+                </a:moveTo>
+                <a:lnTo>
+                  <a:pt x="1442248" y="0"/>
+                </a:lnTo>
+                <a:lnTo>
+                  <a:pt x="1442248" y="432048"/>
+                </a:lnTo>
+                <a:lnTo>
+                  <a:pt x="2088" y="432048"/>
+                </a:lnTo>
+                <a:cubicBezTo>
+                  <a:pt x="3221" y="391786"/>
+                  <a:pt x="1915" y="388694"/>
+                  <a:pt x="1245" y="342875"/>
+                </a:cubicBezTo>
+                <a:cubicBezTo>
+                  <a:pt x="575" y="306317"/>
+                  <a:pt x="981" y="250800"/>
+                  <a:pt x="452" y="212700"/>
+                </a:cubicBezTo>
+                <a:cubicBezTo>
+                  <a:pt x="-77" y="174600"/>
+                  <a:pt x="-218" y="159250"/>
+                  <a:pt x="452" y="116656"/>
+                </a:cubicBezTo>
+                <a:cubicBezTo>
+                  <a:pt x="-591" y="76183"/>
+                  <a:pt x="749" y="38092"/>
+                  <a:pt x="2088" y="0"/>
+                </a:cubicBezTo>
+                <a:close/>
+              </a:path>
+            </a:pathLst>
+          </a:custGeom>
+          <a:ln>
+            <a:solidFill>
+              <a:schemeClr val="accent5">
+                <a:lumMod val="75000"/>
+              </a:schemeClr>
+            </a:solidFill>
+          </a:ln>
+        </p:spPr>
+        <p:style>
+          <a:lnRef idx="2">
+            <a:schemeClr val="accent1">
+              <a:shade val="50000"/>
+            </a:schemeClr>
+          </a:lnRef>
+          <a:fillRef idx="1">
+            <a:schemeClr val="accent1"/>
+          </a:fillRef>
+          <a:effectRef idx="0">
+            <a:schemeClr val="accent1"/>
+          </a:effectRef>
+          <a:fontRef idx="minor">
+            <a:schemeClr val="lt1"/>
+          </a:fontRef>
+        </p:style>
+        <p:txBody>
+          <a:bodyPr rtlCol="0" anchor="ctr"/>
+          <a:lstStyle/>
+          <a:p>
+            <a:pPr algn="ctr"/>
+            <a:r>
+              <a:rPr lang="en-US" altLang="ja-JP" dirty="0" err="1" smtClean="0"/>
+              <a:t>ChannelMergerNode</a:t>
+            </a:r>
+            <a:endParaRPr lang="ja-JP" altLang="en-US" dirty="0"/>
+          </a:p>
+        </p:txBody>
+      </p:sp>
+      <p:cxnSp>
+        <p:nvCxnSpPr>
+          <p:cNvPr id="59" name="カギ線コネクタ 58"/>
+          <p:cNvCxnSpPr>
+            <a:stCxn id="6" idx="3"/>
+            <a:endCxn id="63" idx="6"/>
+          </p:cNvCxnSpPr>
+          <p:nvPr/>
+        </p:nvCxnSpPr>
+        <p:spPr>
+          <a:xfrm flipV="1">
+            <a:off x="3863749" y="1025376"/>
+            <a:ext cx="2376944" cy="603424"/>
+          </a:xfrm>
+          <a:prstGeom prst="bentConnector3">
+            <a:avLst>
+              <a:gd name="adj1" fmla="val 3315"/>
+            </a:avLst>
+          </a:prstGeom>
+          <a:ln w="76200">
+            <a:tailEnd type="triangle"/>
+          </a:ln>
+        </p:spPr>
+        <p:style>
+          <a:lnRef idx="1">
+            <a:schemeClr val="accent1"/>
+          </a:lnRef>
+          <a:fillRef idx="0">
+            <a:schemeClr val="accent1"/>
+          </a:fillRef>
+          <a:effectRef idx="0">
+            <a:schemeClr val="accent1"/>
+          </a:effectRef>
+          <a:fontRef idx="minor">
+            <a:schemeClr val="tx1"/>
+          </a:fontRef>
+        </p:style>
+      </p:cxnSp>
+      <p:cxnSp>
+        <p:nvCxnSpPr>
+          <p:cNvPr id="87" name="直線矢印コネクタ 86"/>
+          <p:cNvCxnSpPr>
+            <a:endCxn id="12" idx="1"/>
+          </p:cNvCxnSpPr>
+          <p:nvPr/>
+        </p:nvCxnSpPr>
+        <p:spPr>
+          <a:xfrm>
+            <a:off x="8400256" y="1124744"/>
+            <a:ext cx="360041" cy="0"/>
+          </a:xfrm>
+          <a:prstGeom prst="straightConnector1">
+            <a:avLst/>
+          </a:prstGeom>
+          <a:ln w="76200">
+            <a:tailEnd type="triangle"/>
+          </a:ln>
+        </p:spPr>
+        <p:style>
+          <a:lnRef idx="1">
+            <a:schemeClr val="accent1"/>
+          </a:lnRef>
+          <a:fillRef idx="0">
+            <a:schemeClr val="accent1"/>
+          </a:fillRef>
+          <a:effectRef idx="0">
+            <a:schemeClr val="accent1"/>
+          </a:effectRef>
+          <a:fontRef idx="minor">
+            <a:schemeClr val="tx1"/>
+          </a:fontRef>
+        </p:style>
+      </p:cxnSp>
+      <p:cxnSp>
+        <p:nvCxnSpPr>
+          <p:cNvPr id="91" name="カギ線コネクタ 90"/>
+          <p:cNvCxnSpPr>
+            <a:stCxn id="12" idx="3"/>
+            <a:endCxn id="41" idx="4"/>
+          </p:cNvCxnSpPr>
+          <p:nvPr/>
+        </p:nvCxnSpPr>
+        <p:spPr>
+          <a:xfrm flipV="1">
+            <a:off x="9912424" y="819547"/>
+            <a:ext cx="433041" cy="305197"/>
+          </a:xfrm>
+          <a:prstGeom prst="bentConnector3">
+            <a:avLst>
+              <a:gd name="adj1" fmla="val 26012"/>
+            </a:avLst>
+          </a:prstGeom>
+          <a:ln w="76200">
+            <a:tailEnd type="triangle"/>
+          </a:ln>
+        </p:spPr>
+        <p:style>
+          <a:lnRef idx="1">
+            <a:schemeClr val="accent1"/>
+          </a:lnRef>
+          <a:fillRef idx="0">
+            <a:schemeClr val="accent1"/>
+          </a:fillRef>
+          <a:effectRef idx="0">
+            <a:schemeClr val="accent1"/>
+          </a:effectRef>
+          <a:fontRef idx="minor">
+            <a:schemeClr val="tx1"/>
+          </a:fontRef>
+        </p:style>
+      </p:cxnSp>
+      <p:cxnSp>
+        <p:nvCxnSpPr>
+          <p:cNvPr id="113" name="カギ線コネクタ 112"/>
+          <p:cNvCxnSpPr>
+            <a:stCxn id="35" idx="3"/>
+            <a:endCxn id="63" idx="4"/>
+          </p:cNvCxnSpPr>
+          <p:nvPr/>
+        </p:nvCxnSpPr>
+        <p:spPr>
+          <a:xfrm flipV="1">
+            <a:off x="5591941" y="1251595"/>
+            <a:ext cx="649940" cy="377205"/>
+          </a:xfrm>
+          <a:prstGeom prst="bentConnector3">
+            <a:avLst>
+              <a:gd name="adj1" fmla="val 49588"/>
+            </a:avLst>
+          </a:prstGeom>
+          <a:ln w="76200">
+            <a:tailEnd type="triangle"/>
+          </a:ln>
+        </p:spPr>
+        <p:style>
+          <a:lnRef idx="1">
+            <a:schemeClr val="accent1"/>
+          </a:lnRef>
+          <a:fillRef idx="0">
+            <a:schemeClr val="accent1"/>
+          </a:fillRef>
+          <a:effectRef idx="0">
+            <a:schemeClr val="accent1"/>
+          </a:effectRef>
+          <a:fontRef idx="minor">
+            <a:schemeClr val="tx1"/>
+          </a:fontRef>
+        </p:style>
+      </p:cxnSp>
+      <p:cxnSp>
+        <p:nvCxnSpPr>
+          <p:cNvPr id="119" name="カギ線コネクタ 118"/>
+          <p:cNvCxnSpPr>
+            <a:stCxn id="4" idx="3"/>
+            <a:endCxn id="41" idx="6"/>
+          </p:cNvCxnSpPr>
+          <p:nvPr/>
+        </p:nvCxnSpPr>
+        <p:spPr>
+          <a:xfrm flipV="1">
+            <a:off x="1991544" y="593328"/>
+            <a:ext cx="8353287" cy="1035472"/>
+          </a:xfrm>
+          <a:prstGeom prst="bentConnector3">
+            <a:avLst>
+              <a:gd name="adj1" fmla="val 1606"/>
+            </a:avLst>
+          </a:prstGeom>
+          <a:ln w="76200">
+            <a:tailEnd type="triangle"/>
+          </a:ln>
+        </p:spPr>
+        <p:style>
+          <a:lnRef idx="1">
+            <a:schemeClr val="accent1"/>
+          </a:lnRef>
+          <a:fillRef idx="0">
+            <a:schemeClr val="accent1"/>
+          </a:fillRef>
+          <a:effectRef idx="0">
+            <a:schemeClr val="accent1"/>
+          </a:effectRef>
+          <a:fontRef idx="minor">
+            <a:schemeClr val="tx1"/>
+          </a:fontRef>
+        </p:style>
+      </p:cxnSp>
+      <p:sp>
+        <p:nvSpPr>
+          <p:cNvPr id="128" name="正方形/長方形 127"/>
+          <p:cNvSpPr/>
+          <p:nvPr/>
+        </p:nvSpPr>
+        <p:spPr>
+          <a:xfrm>
+            <a:off x="2279576" y="3356992"/>
+            <a:ext cx="72008" cy="72008"/>
+          </a:xfrm>
+          <a:prstGeom prst="rect">
+            <a:avLst/>
+          </a:prstGeom>
+          <a:ln>
+            <a:noFill/>
+          </a:ln>
+        </p:spPr>
+        <p:style>
+          <a:lnRef idx="2">
+            <a:schemeClr val="accent1">
+              <a:shade val="50000"/>
+            </a:schemeClr>
+          </a:lnRef>
+          <a:fillRef idx="1">
+            <a:schemeClr val="accent1"/>
+          </a:fillRef>
+          <a:effectRef idx="0">
+            <a:schemeClr val="accent1"/>
+          </a:effectRef>
+          <a:fontRef idx="minor">
+            <a:schemeClr val="lt1"/>
+          </a:fontRef>
+        </p:style>
+        <p:txBody>
+          <a:bodyPr rtlCol="0" anchor="ctr"/>
+          <a:lstStyle/>
+          <a:p>
+            <a:pPr algn="ctr"/>
+            <a:endParaRPr kumimoji="1" lang="ja-JP" altLang="en-US"/>
+          </a:p>
+        </p:txBody>
+      </p:sp>
+      <p:cxnSp>
+        <p:nvCxnSpPr>
+          <p:cNvPr id="145" name="カギ線コネクタ 144"/>
+          <p:cNvCxnSpPr>
+            <a:stCxn id="128" idx="1"/>
+          </p:cNvCxnSpPr>
+          <p:nvPr/>
+        </p:nvCxnSpPr>
+        <p:spPr>
+          <a:xfrm rot="10800000">
+            <a:off x="2135560" y="1700808"/>
+            <a:ext cx="144016" cy="1692188"/>
+          </a:xfrm>
+          <a:prstGeom prst="bentConnector2">
+            <a:avLst/>
+          </a:prstGeom>
+          <a:ln w="76200">
+            <a:tailEnd type="triangle"/>
+          </a:ln>
+        </p:spPr>
+        <p:style>
+          <a:lnRef idx="1">
+            <a:schemeClr val="accent1"/>
+          </a:lnRef>
+          <a:fillRef idx="0">
+            <a:schemeClr val="accent1"/>
+          </a:fillRef>
+          <a:effectRef idx="0">
+            <a:schemeClr val="accent1"/>
+          </a:effectRef>
+          <a:fontRef idx="minor">
+            <a:schemeClr val="tx1"/>
+          </a:fontRef>
+        </p:style>
+      </p:cxnSp>
+      <p:cxnSp>
+        <p:nvCxnSpPr>
+          <p:cNvPr id="164" name="カギ線コネクタ 163"/>
+          <p:cNvCxnSpPr>
+            <a:stCxn id="35" idx="3"/>
+            <a:endCxn id="10" idx="1"/>
+          </p:cNvCxnSpPr>
+          <p:nvPr/>
+        </p:nvCxnSpPr>
+        <p:spPr>
+          <a:xfrm>
+            <a:off x="5591941" y="1628800"/>
+            <a:ext cx="648075" cy="792088"/>
+          </a:xfrm>
+          <a:prstGeom prst="bentConnector3">
+            <a:avLst/>
+          </a:prstGeom>
+          <a:ln w="76200">
+            <a:tailEnd type="triangle"/>
+          </a:ln>
+        </p:spPr>
+        <p:style>
+          <a:lnRef idx="1">
+            <a:schemeClr val="accent1"/>
+          </a:lnRef>
+          <a:fillRef idx="0">
+            <a:schemeClr val="accent1"/>
+          </a:fillRef>
+          <a:effectRef idx="0">
+            <a:schemeClr val="accent1"/>
+          </a:effectRef>
+          <a:fontRef idx="minor">
+            <a:schemeClr val="tx1"/>
+          </a:fontRef>
+        </p:style>
+      </p:cxnSp>
+      <p:sp>
+        <p:nvSpPr>
+          <p:cNvPr id="194" name="正方形/長方形 193"/>
+          <p:cNvSpPr/>
+          <p:nvPr/>
+        </p:nvSpPr>
+        <p:spPr>
+          <a:xfrm>
+            <a:off x="695401" y="3717032"/>
+            <a:ext cx="2232248" cy="432048"/>
+          </a:xfrm>
+          <a:prstGeom prst="rect">
+            <a:avLst/>
+          </a:prstGeom>
+          <a:solidFill>
+            <a:schemeClr val="accent1"/>
+          </a:solidFill>
+          <a:ln>
+            <a:solidFill>
+              <a:schemeClr val="accent1">
+                <a:lumMod val="50000"/>
+              </a:schemeClr>
+            </a:solidFill>
+          </a:ln>
+        </p:spPr>
+        <p:style>
+          <a:lnRef idx="2">
+            <a:schemeClr val="accent1">
+              <a:shade val="50000"/>
+            </a:schemeClr>
+          </a:lnRef>
+          <a:fillRef idx="1">
+            <a:schemeClr val="accent1"/>
+          </a:fillRef>
+          <a:effectRef idx="0">
+            <a:schemeClr val="accent1"/>
+          </a:effectRef>
+          <a:fontRef idx="minor">
+            <a:schemeClr val="lt1"/>
+          </a:fontRef>
+        </p:style>
+        <p:txBody>
+          <a:bodyPr rtlCol="0" anchor="ctr"/>
+          <a:lstStyle/>
+          <a:p>
+            <a:pPr algn="ctr"/>
+            <a:r>
+              <a:rPr kumimoji="1" lang="en-US" altLang="ja-JP" dirty="0" err="1" smtClean="0"/>
+              <a:t>ConstantSourceNode</a:t>
+            </a:r>
+            <a:endParaRPr kumimoji="1" lang="ja-JP" altLang="en-US" dirty="0"/>
+          </a:p>
+        </p:txBody>
+      </p:sp>
+      <p:sp>
+        <p:nvSpPr>
+          <p:cNvPr id="195" name="正方形/長方形 194"/>
+          <p:cNvSpPr/>
+          <p:nvPr/>
+        </p:nvSpPr>
+        <p:spPr>
+          <a:xfrm>
+            <a:off x="695400" y="4149080"/>
+            <a:ext cx="2232249" cy="432048"/>
+          </a:xfrm>
+          <a:prstGeom prst="rect">
+            <a:avLst/>
+          </a:prstGeom>
+          <a:solidFill>
+            <a:schemeClr val="bg1"/>
+          </a:solidFill>
+          <a:ln>
+            <a:solidFill>
+              <a:schemeClr val="accent1">
+                <a:lumMod val="50000"/>
+              </a:schemeClr>
+            </a:solidFill>
+          </a:ln>
+        </p:spPr>
+        <p:style>
+          <a:lnRef idx="2">
+            <a:schemeClr val="accent1">
+              <a:shade val="50000"/>
+            </a:schemeClr>
+          </a:lnRef>
+          <a:fillRef idx="1">
+            <a:schemeClr val="accent1"/>
+          </a:fillRef>
+          <a:effectRef idx="0">
+            <a:schemeClr val="accent1"/>
+          </a:effectRef>
+          <a:fontRef idx="minor">
+            <a:schemeClr val="lt1"/>
+          </a:fontRef>
+        </p:style>
+        <p:txBody>
+          <a:bodyPr rtlCol="0" anchor="ctr"/>
+          <a:lstStyle/>
+          <a:p>
+            <a:r>
+              <a:rPr kumimoji="1" lang="en-US" altLang="ja-JP" dirty="0" smtClean="0">
+                <a:solidFill>
+                  <a:schemeClr val="accent1"/>
+                </a:solidFill>
+              </a:rPr>
+              <a:t>offset (</a:t>
+            </a:r>
+            <a:r>
+              <a:rPr kumimoji="1" lang="en-US" altLang="ja-JP" dirty="0" err="1" smtClean="0">
+                <a:solidFill>
+                  <a:schemeClr val="accent1"/>
+                </a:solidFill>
+              </a:rPr>
+              <a:t>delayTime</a:t>
+            </a:r>
+            <a:r>
+              <a:rPr kumimoji="1" lang="en-US" altLang="ja-JP" dirty="0" smtClean="0">
+                <a:solidFill>
+                  <a:schemeClr val="accent1"/>
+                </a:solidFill>
+              </a:rPr>
+              <a:t>)</a:t>
+            </a:r>
+            <a:endParaRPr kumimoji="1" lang="ja-JP" altLang="en-US" dirty="0">
+              <a:solidFill>
+                <a:schemeClr val="accent1"/>
+              </a:solidFill>
+            </a:endParaRPr>
+          </a:p>
+        </p:txBody>
+      </p:sp>
+      <p:cxnSp>
+        <p:nvCxnSpPr>
+          <p:cNvPr id="197" name="カギ線コネクタ 196"/>
+          <p:cNvCxnSpPr>
+            <a:stCxn id="194" idx="3"/>
+            <a:endCxn id="9" idx="2"/>
+          </p:cNvCxnSpPr>
+          <p:nvPr/>
+        </p:nvCxnSpPr>
+        <p:spPr>
+          <a:xfrm flipV="1">
+            <a:off x="2927649" y="2276872"/>
+            <a:ext cx="252026" cy="1656184"/>
+          </a:xfrm>
+          <a:prstGeom prst="bentConnector2">
+            <a:avLst/>
+          </a:prstGeom>
+          <a:ln w="38100">
+            <a:prstDash val="sysDot"/>
+            <a:tailEnd type="triangle"/>
+          </a:ln>
+        </p:spPr>
+        <p:style>
+          <a:lnRef idx="1">
+            <a:schemeClr val="accent1"/>
+          </a:lnRef>
+          <a:fillRef idx="0">
+            <a:schemeClr val="accent1"/>
+          </a:fillRef>
+          <a:effectRef idx="0">
+            <a:schemeClr val="accent1"/>
+          </a:effectRef>
+          <a:fontRef idx="minor">
+            <a:schemeClr val="tx1"/>
+          </a:fontRef>
+        </p:style>
+      </p:cxnSp>
+      <p:cxnSp>
+        <p:nvCxnSpPr>
+          <p:cNvPr id="199" name="カギ線コネクタ 198"/>
+          <p:cNvCxnSpPr>
+            <a:stCxn id="194" idx="3"/>
+            <a:endCxn id="36" idx="2"/>
+          </p:cNvCxnSpPr>
+          <p:nvPr/>
+        </p:nvCxnSpPr>
+        <p:spPr>
+          <a:xfrm flipV="1">
+            <a:off x="2927649" y="2276872"/>
+            <a:ext cx="1980218" cy="1656184"/>
+          </a:xfrm>
+          <a:prstGeom prst="bentConnector2">
+            <a:avLst/>
+          </a:prstGeom>
+          <a:ln w="38100">
+            <a:prstDash val="sysDot"/>
+            <a:tailEnd type="triangle"/>
+          </a:ln>
+        </p:spPr>
+        <p:style>
+          <a:lnRef idx="1">
+            <a:schemeClr val="accent1"/>
+          </a:lnRef>
+          <a:fillRef idx="0">
+            <a:schemeClr val="accent1"/>
+          </a:fillRef>
+          <a:effectRef idx="0">
+            <a:schemeClr val="accent1"/>
+          </a:effectRef>
+          <a:fontRef idx="minor">
+            <a:schemeClr val="tx1"/>
+          </a:fontRef>
+        </p:style>
+      </p:cxnSp>
+    </p:spTree>
+    <p:extLst>
+      <p:ext uri="{BB962C8B-B14F-4D97-AF65-F5344CB8AC3E}">
+        <p14:creationId xmlns:p14="http://schemas.microsoft.com/office/powerpoint/2010/main" val="3171972793"/>
+      </p:ext>
+    </p:extLst>
+  </p:cSld>
+  <p:clrMapOvr>
+    <a:masterClrMapping/>
+  </p:clrMapOvr>
+  <p:timing>
+    <p:tnLst>
+      <p:par>
+        <p:cTn id="1" dur="indefinite" restart="never" nodeType="tmRoot"/>
+      </p:par>
+    </p:tnLst>
+  </p:timing>
+</p:sld>
+</file>
+
 <file path=ppt/theme/theme1.xml><?xml version="1.0" encoding="utf-8"?>
 <a:theme xmlns:a="http://schemas.openxmlformats.org/drawingml/2006/main" name="Office テーマ">
   <a:themeElements>

</xml_diff>